<commit_message>
Atualização até pagina 9
</commit_message>
<xml_diff>
--- a/Apresentação/Cap1_theDataWarehouse.pptx
+++ b/Apresentação/Cap1_theDataWarehouse.pptx
@@ -10,13 +10,17 @@
     <p:sldId id="258" r:id="rId4"/>
     <p:sldId id="259" r:id="rId5"/>
     <p:sldId id="260" r:id="rId6"/>
-    <p:sldId id="261" r:id="rId7"/>
-    <p:sldId id="262" r:id="rId8"/>
-    <p:sldId id="263" r:id="rId9"/>
-    <p:sldId id="264" r:id="rId10"/>
-    <p:sldId id="265" r:id="rId11"/>
-    <p:sldId id="266" r:id="rId12"/>
-    <p:sldId id="267" r:id="rId13"/>
+    <p:sldId id="268" r:id="rId7"/>
+    <p:sldId id="269" r:id="rId8"/>
+    <p:sldId id="270" r:id="rId9"/>
+    <p:sldId id="271" r:id="rId10"/>
+    <p:sldId id="261" r:id="rId11"/>
+    <p:sldId id="262" r:id="rId12"/>
+    <p:sldId id="263" r:id="rId13"/>
+    <p:sldId id="264" r:id="rId14"/>
+    <p:sldId id="265" r:id="rId15"/>
+    <p:sldId id="266" r:id="rId16"/>
+    <p:sldId id="267" r:id="rId17"/>
   </p:sldIdLst>
   <p:sldSz cx="12192000" cy="6858000"/>
   <p:notesSz cx="6858000" cy="9144000"/>
@@ -845,7 +849,7 @@
           <a:p>
             <a:fld id="{89716CB2-982F-499D-B8ED-B1B1FED2E74C}" type="datetimeFigureOut">
               <a:rPr lang="pt-BR" smtClean="0"/>
-              <a:t>28/05/2018</a:t>
+              <a:t>29/05/2018</a:t>
             </a:fld>
             <a:endParaRPr lang="pt-BR"/>
           </a:p>
@@ -1096,7 +1100,7 @@
           <a:p>
             <a:fld id="{89716CB2-982F-499D-B8ED-B1B1FED2E74C}" type="datetimeFigureOut">
               <a:rPr lang="pt-BR" smtClean="0"/>
-              <a:t>28/05/2018</a:t>
+              <a:t>29/05/2018</a:t>
             </a:fld>
             <a:endParaRPr lang="pt-BR"/>
           </a:p>
@@ -1410,7 +1414,7 @@
           <a:p>
             <a:fld id="{89716CB2-982F-499D-B8ED-B1B1FED2E74C}" type="datetimeFigureOut">
               <a:rPr lang="pt-BR" smtClean="0"/>
-              <a:t>28/05/2018</a:t>
+              <a:t>29/05/2018</a:t>
             </a:fld>
             <a:endParaRPr lang="pt-BR"/>
           </a:p>
@@ -1751,7 +1755,7 @@
           <a:p>
             <a:fld id="{89716CB2-982F-499D-B8ED-B1B1FED2E74C}" type="datetimeFigureOut">
               <a:rPr lang="pt-BR" smtClean="0"/>
-              <a:t>28/05/2018</a:t>
+              <a:t>29/05/2018</a:t>
             </a:fld>
             <a:endParaRPr lang="pt-BR"/>
           </a:p>
@@ -2065,7 +2069,7 @@
           <a:p>
             <a:fld id="{89716CB2-982F-499D-B8ED-B1B1FED2E74C}" type="datetimeFigureOut">
               <a:rPr lang="pt-BR" smtClean="0"/>
-              <a:t>28/05/2018</a:t>
+              <a:t>29/05/2018</a:t>
             </a:fld>
             <a:endParaRPr lang="pt-BR"/>
           </a:p>
@@ -2458,7 +2462,7 @@
           <a:p>
             <a:fld id="{89716CB2-982F-499D-B8ED-B1B1FED2E74C}" type="datetimeFigureOut">
               <a:rPr lang="pt-BR" smtClean="0"/>
-              <a:t>28/05/2018</a:t>
+              <a:t>29/05/2018</a:t>
             </a:fld>
             <a:endParaRPr lang="pt-BR"/>
           </a:p>
@@ -2628,7 +2632,7 @@
           <a:p>
             <a:fld id="{89716CB2-982F-499D-B8ED-B1B1FED2E74C}" type="datetimeFigureOut">
               <a:rPr lang="pt-BR" smtClean="0"/>
-              <a:t>28/05/2018</a:t>
+              <a:t>29/05/2018</a:t>
             </a:fld>
             <a:endParaRPr lang="pt-BR"/>
           </a:p>
@@ -2808,7 +2812,7 @@
           <a:p>
             <a:fld id="{89716CB2-982F-499D-B8ED-B1B1FED2E74C}" type="datetimeFigureOut">
               <a:rPr lang="pt-BR" smtClean="0"/>
-              <a:t>28/05/2018</a:t>
+              <a:t>29/05/2018</a:t>
             </a:fld>
             <a:endParaRPr lang="pt-BR"/>
           </a:p>
@@ -2984,7 +2988,7 @@
           <a:p>
             <a:fld id="{89716CB2-982F-499D-B8ED-B1B1FED2E74C}" type="datetimeFigureOut">
               <a:rPr lang="pt-BR" smtClean="0"/>
-              <a:t>28/05/2018</a:t>
+              <a:t>29/05/2018</a:t>
             </a:fld>
             <a:endParaRPr lang="pt-BR"/>
           </a:p>
@@ -3231,7 +3235,7 @@
           <a:p>
             <a:fld id="{89716CB2-982F-499D-B8ED-B1B1FED2E74C}" type="datetimeFigureOut">
               <a:rPr lang="pt-BR" smtClean="0"/>
-              <a:t>28/05/2018</a:t>
+              <a:t>29/05/2018</a:t>
             </a:fld>
             <a:endParaRPr lang="pt-BR"/>
           </a:p>
@@ -3463,7 +3467,7 @@
           <a:p>
             <a:fld id="{89716CB2-982F-499D-B8ED-B1B1FED2E74C}" type="datetimeFigureOut">
               <a:rPr lang="pt-BR" smtClean="0"/>
-              <a:t>28/05/2018</a:t>
+              <a:t>29/05/2018</a:t>
             </a:fld>
             <a:endParaRPr lang="pt-BR"/>
           </a:p>
@@ -3837,7 +3841,7 @@
           <a:p>
             <a:fld id="{89716CB2-982F-499D-B8ED-B1B1FED2E74C}" type="datetimeFigureOut">
               <a:rPr lang="pt-BR" smtClean="0"/>
-              <a:t>28/05/2018</a:t>
+              <a:t>29/05/2018</a:t>
             </a:fld>
             <a:endParaRPr lang="pt-BR"/>
           </a:p>
@@ -3960,7 +3964,7 @@
           <a:p>
             <a:fld id="{89716CB2-982F-499D-B8ED-B1B1FED2E74C}" type="datetimeFigureOut">
               <a:rPr lang="pt-BR" smtClean="0"/>
-              <a:t>28/05/2018</a:t>
+              <a:t>29/05/2018</a:t>
             </a:fld>
             <a:endParaRPr lang="pt-BR"/>
           </a:p>
@@ -4055,7 +4059,7 @@
           <a:p>
             <a:fld id="{89716CB2-982F-499D-B8ED-B1B1FED2E74C}" type="datetimeFigureOut">
               <a:rPr lang="pt-BR" smtClean="0"/>
-              <a:t>28/05/2018</a:t>
+              <a:t>29/05/2018</a:t>
             </a:fld>
             <a:endParaRPr lang="pt-BR"/>
           </a:p>
@@ -4310,7 +4314,7 @@
           <a:p>
             <a:fld id="{89716CB2-982F-499D-B8ED-B1B1FED2E74C}" type="datetimeFigureOut">
               <a:rPr lang="pt-BR" smtClean="0"/>
-              <a:t>28/05/2018</a:t>
+              <a:t>29/05/2018</a:t>
             </a:fld>
             <a:endParaRPr lang="pt-BR"/>
           </a:p>
@@ -4573,7 +4577,7 @@
           <a:p>
             <a:fld id="{89716CB2-982F-499D-B8ED-B1B1FED2E74C}" type="datetimeFigureOut">
               <a:rPr lang="pt-BR" smtClean="0"/>
-              <a:t>28/05/2018</a:t>
+              <a:t>29/05/2018</a:t>
             </a:fld>
             <a:endParaRPr lang="pt-BR"/>
           </a:p>
@@ -5316,7 +5320,7 @@
           <a:p>
             <a:fld id="{89716CB2-982F-499D-B8ED-B1B1FED2E74C}" type="datetimeFigureOut">
               <a:rPr lang="pt-BR" smtClean="0"/>
-              <a:t>28/05/2018</a:t>
+              <a:t>29/05/2018</a:t>
             </a:fld>
             <a:endParaRPr lang="pt-BR"/>
           </a:p>
@@ -5940,13 +5944,13 @@
           <a:p>
             <a:r>
               <a:rPr lang="pt-BR" b="1" dirty="0"/>
-              <a:t>Mais razões para pensar </a:t>
-            </a:r>
-            <a:r>
-              <a:rPr lang="pt-BR" b="1" dirty="0" err="1"/>
-              <a:t>dimensionalmente</a:t>
-            </a:r>
-            <a:endParaRPr lang="pt-BR" b="1" dirty="0"/>
+              <a:t>Introdução à Modelagem </a:t>
+            </a:r>
+            <a:r>
+              <a:rPr lang="pt-BR" b="1" dirty="0" smtClean="0"/>
+              <a:t>Dimensional</a:t>
+            </a:r>
+            <a:endParaRPr lang="pt-BR" dirty="0"/>
           </a:p>
         </p:txBody>
       </p:sp>
@@ -5972,13 +5976,20 @@
     </p:spTree>
     <p:extLst>
       <p:ext uri="{BB962C8B-B14F-4D97-AF65-F5344CB8AC3E}">
-        <p14:creationId xmlns:p14="http://schemas.microsoft.com/office/powerpoint/2010/main" val="909987682"/>
+        <p14:creationId xmlns:p14="http://schemas.microsoft.com/office/powerpoint/2010/main" val="2232287699"/>
       </p:ext>
     </p:extLst>
   </p:cSld>
   <p:clrMapOvr>
     <a:masterClrMapping/>
   </p:clrMapOvr>
+  <p:timing>
+    <p:tnLst>
+      <p:par>
+        <p:cTn id="1" dur="indefinite" restart="never" nodeType="tmRoot"/>
+      </p:par>
+    </p:tnLst>
+  </p:timing>
 </p:sld>
 </file>
 
@@ -6016,6 +6027,315 @@
           <a:p>
             <a:r>
               <a:rPr lang="pt-BR" b="1" dirty="0"/>
+              <a:t>Arquitetura DW / BI de </a:t>
+            </a:r>
+            <a:r>
+              <a:rPr lang="pt-BR" b="1" dirty="0" err="1"/>
+              <a:t>Kimball</a:t>
+            </a:r>
+            <a:r>
+              <a:rPr lang="pt-BR" b="1" dirty="0"/>
+              <a:t/>
+            </a:r>
+            <a:br>
+              <a:rPr lang="pt-BR" b="1" dirty="0"/>
+            </a:br>
+            <a:endParaRPr lang="pt-BR" dirty="0"/>
+          </a:p>
+        </p:txBody>
+      </p:sp>
+      <p:sp>
+        <p:nvSpPr>
+          <p:cNvPr id="3" name="Espaço Reservado para Conteúdo 2"/>
+          <p:cNvSpPr>
+            <a:spLocks noGrp="1"/>
+          </p:cNvSpPr>
+          <p:nvPr>
+            <p:ph idx="1"/>
+          </p:nvPr>
+        </p:nvSpPr>
+        <p:spPr/>
+        <p:txBody>
+          <a:bodyPr/>
+          <a:lstStyle/>
+          <a:p>
+            <a:endParaRPr lang="pt-BR"/>
+          </a:p>
+        </p:txBody>
+      </p:sp>
+    </p:spTree>
+    <p:extLst>
+      <p:ext uri="{BB962C8B-B14F-4D97-AF65-F5344CB8AC3E}">
+        <p14:creationId xmlns:p14="http://schemas.microsoft.com/office/powerpoint/2010/main" val="907617143"/>
+      </p:ext>
+    </p:extLst>
+  </p:cSld>
+  <p:clrMapOvr>
+    <a:masterClrMapping/>
+  </p:clrMapOvr>
+</p:sld>
+</file>
+
+<file path=ppt/slides/slide12.xml><?xml version="1.0" encoding="utf-8"?>
+<p:sld xmlns:a="http://schemas.openxmlformats.org/drawingml/2006/main" xmlns:r="http://schemas.openxmlformats.org/officeDocument/2006/relationships" xmlns:p="http://schemas.openxmlformats.org/presentationml/2006/main">
+  <p:cSld>
+    <p:spTree>
+      <p:nvGrpSpPr>
+        <p:cNvPr id="1" name=""/>
+        <p:cNvGrpSpPr/>
+        <p:nvPr/>
+      </p:nvGrpSpPr>
+      <p:grpSpPr>
+        <a:xfrm>
+          <a:off x="0" y="0"/>
+          <a:ext cx="0" cy="0"/>
+          <a:chOff x="0" y="0"/>
+          <a:chExt cx="0" cy="0"/>
+        </a:xfrm>
+      </p:grpSpPr>
+      <p:sp>
+        <p:nvSpPr>
+          <p:cNvPr id="2" name="Título 1"/>
+          <p:cNvSpPr>
+            <a:spLocks noGrp="1"/>
+          </p:cNvSpPr>
+          <p:nvPr>
+            <p:ph type="title"/>
+          </p:nvPr>
+        </p:nvSpPr>
+        <p:spPr/>
+        <p:txBody>
+          <a:bodyPr/>
+          <a:lstStyle/>
+          <a:p>
+            <a:r>
+              <a:rPr lang="pt-BR" b="1" dirty="0"/>
+              <a:t>Arquiteturas alternativas DW / BI</a:t>
+            </a:r>
+            <a:br>
+              <a:rPr lang="pt-BR" b="1" dirty="0"/>
+            </a:br>
+            <a:endParaRPr lang="pt-BR" dirty="0"/>
+          </a:p>
+        </p:txBody>
+      </p:sp>
+      <p:sp>
+        <p:nvSpPr>
+          <p:cNvPr id="3" name="Espaço Reservado para Conteúdo 2"/>
+          <p:cNvSpPr>
+            <a:spLocks noGrp="1"/>
+          </p:cNvSpPr>
+          <p:nvPr>
+            <p:ph idx="1"/>
+          </p:nvPr>
+        </p:nvSpPr>
+        <p:spPr/>
+        <p:txBody>
+          <a:bodyPr/>
+          <a:lstStyle/>
+          <a:p>
+            <a:endParaRPr lang="pt-BR"/>
+          </a:p>
+        </p:txBody>
+      </p:sp>
+    </p:spTree>
+    <p:extLst>
+      <p:ext uri="{BB962C8B-B14F-4D97-AF65-F5344CB8AC3E}">
+        <p14:creationId xmlns:p14="http://schemas.microsoft.com/office/powerpoint/2010/main" val="1405799173"/>
+      </p:ext>
+    </p:extLst>
+  </p:cSld>
+  <p:clrMapOvr>
+    <a:masterClrMapping/>
+  </p:clrMapOvr>
+</p:sld>
+</file>
+
+<file path=ppt/slides/slide13.xml><?xml version="1.0" encoding="utf-8"?>
+<p:sld xmlns:a="http://schemas.openxmlformats.org/drawingml/2006/main" xmlns:r="http://schemas.openxmlformats.org/officeDocument/2006/relationships" xmlns:p="http://schemas.openxmlformats.org/presentationml/2006/main">
+  <p:cSld>
+    <p:spTree>
+      <p:nvGrpSpPr>
+        <p:cNvPr id="1" name=""/>
+        <p:cNvGrpSpPr/>
+        <p:nvPr/>
+      </p:nvGrpSpPr>
+      <p:grpSpPr>
+        <a:xfrm>
+          <a:off x="0" y="0"/>
+          <a:ext cx="0" cy="0"/>
+          <a:chOff x="0" y="0"/>
+          <a:chExt cx="0" cy="0"/>
+        </a:xfrm>
+      </p:grpSpPr>
+      <p:sp>
+        <p:nvSpPr>
+          <p:cNvPr id="2" name="Título 1"/>
+          <p:cNvSpPr>
+            <a:spLocks noGrp="1"/>
+          </p:cNvSpPr>
+          <p:nvPr>
+            <p:ph type="title"/>
+          </p:nvPr>
+        </p:nvSpPr>
+        <p:spPr/>
+        <p:txBody>
+          <a:bodyPr/>
+          <a:lstStyle/>
+          <a:p>
+            <a:r>
+              <a:rPr lang="pt-BR" b="1" dirty="0"/>
+              <a:t>Mitos de Modelagem Dimensional</a:t>
+            </a:r>
+            <a:br>
+              <a:rPr lang="pt-BR" b="1" dirty="0"/>
+            </a:br>
+            <a:endParaRPr lang="pt-BR" dirty="0"/>
+          </a:p>
+        </p:txBody>
+      </p:sp>
+      <p:sp>
+        <p:nvSpPr>
+          <p:cNvPr id="3" name="Espaço Reservado para Conteúdo 2"/>
+          <p:cNvSpPr>
+            <a:spLocks noGrp="1"/>
+          </p:cNvSpPr>
+          <p:nvPr>
+            <p:ph idx="1"/>
+          </p:nvPr>
+        </p:nvSpPr>
+        <p:spPr/>
+        <p:txBody>
+          <a:bodyPr/>
+          <a:lstStyle/>
+          <a:p>
+            <a:endParaRPr lang="pt-BR"/>
+          </a:p>
+        </p:txBody>
+      </p:sp>
+    </p:spTree>
+    <p:extLst>
+      <p:ext uri="{BB962C8B-B14F-4D97-AF65-F5344CB8AC3E}">
+        <p14:creationId xmlns:p14="http://schemas.microsoft.com/office/powerpoint/2010/main" val="367052800"/>
+      </p:ext>
+    </p:extLst>
+  </p:cSld>
+  <p:clrMapOvr>
+    <a:masterClrMapping/>
+  </p:clrMapOvr>
+</p:sld>
+</file>
+
+<file path=ppt/slides/slide14.xml><?xml version="1.0" encoding="utf-8"?>
+<p:sld xmlns:a="http://schemas.openxmlformats.org/drawingml/2006/main" xmlns:r="http://schemas.openxmlformats.org/officeDocument/2006/relationships" xmlns:p="http://schemas.openxmlformats.org/presentationml/2006/main">
+  <p:cSld>
+    <p:spTree>
+      <p:nvGrpSpPr>
+        <p:cNvPr id="1" name=""/>
+        <p:cNvGrpSpPr/>
+        <p:nvPr/>
+      </p:nvGrpSpPr>
+      <p:grpSpPr>
+        <a:xfrm>
+          <a:off x="0" y="0"/>
+          <a:ext cx="0" cy="0"/>
+          <a:chOff x="0" y="0"/>
+          <a:chExt cx="0" cy="0"/>
+        </a:xfrm>
+      </p:grpSpPr>
+      <p:sp>
+        <p:nvSpPr>
+          <p:cNvPr id="2" name="Título 1"/>
+          <p:cNvSpPr>
+            <a:spLocks noGrp="1"/>
+          </p:cNvSpPr>
+          <p:nvPr>
+            <p:ph type="title"/>
+          </p:nvPr>
+        </p:nvSpPr>
+        <p:spPr/>
+        <p:txBody>
+          <a:bodyPr/>
+          <a:lstStyle/>
+          <a:p>
+            <a:r>
+              <a:rPr lang="pt-BR" b="1" dirty="0"/>
+              <a:t>Mais razões para pensar </a:t>
+            </a:r>
+            <a:r>
+              <a:rPr lang="pt-BR" b="1" dirty="0" err="1"/>
+              <a:t>dimensionalmente</a:t>
+            </a:r>
+            <a:endParaRPr lang="pt-BR" b="1" dirty="0"/>
+          </a:p>
+        </p:txBody>
+      </p:sp>
+      <p:sp>
+        <p:nvSpPr>
+          <p:cNvPr id="3" name="Espaço Reservado para Conteúdo 2"/>
+          <p:cNvSpPr>
+            <a:spLocks noGrp="1"/>
+          </p:cNvSpPr>
+          <p:nvPr>
+            <p:ph idx="1"/>
+          </p:nvPr>
+        </p:nvSpPr>
+        <p:spPr/>
+        <p:txBody>
+          <a:bodyPr/>
+          <a:lstStyle/>
+          <a:p>
+            <a:endParaRPr lang="pt-BR"/>
+          </a:p>
+        </p:txBody>
+      </p:sp>
+    </p:spTree>
+    <p:extLst>
+      <p:ext uri="{BB962C8B-B14F-4D97-AF65-F5344CB8AC3E}">
+        <p14:creationId xmlns:p14="http://schemas.microsoft.com/office/powerpoint/2010/main" val="909987682"/>
+      </p:ext>
+    </p:extLst>
+  </p:cSld>
+  <p:clrMapOvr>
+    <a:masterClrMapping/>
+  </p:clrMapOvr>
+</p:sld>
+</file>
+
+<file path=ppt/slides/slide15.xml><?xml version="1.0" encoding="utf-8"?>
+<p:sld xmlns:a="http://schemas.openxmlformats.org/drawingml/2006/main" xmlns:r="http://schemas.openxmlformats.org/officeDocument/2006/relationships" xmlns:p="http://schemas.openxmlformats.org/presentationml/2006/main">
+  <p:cSld>
+    <p:spTree>
+      <p:nvGrpSpPr>
+        <p:cNvPr id="1" name=""/>
+        <p:cNvGrpSpPr/>
+        <p:nvPr/>
+      </p:nvGrpSpPr>
+      <p:grpSpPr>
+        <a:xfrm>
+          <a:off x="0" y="0"/>
+          <a:ext cx="0" cy="0"/>
+          <a:chOff x="0" y="0"/>
+          <a:chExt cx="0" cy="0"/>
+        </a:xfrm>
+      </p:grpSpPr>
+      <p:sp>
+        <p:nvSpPr>
+          <p:cNvPr id="2" name="Título 1"/>
+          <p:cNvSpPr>
+            <a:spLocks noGrp="1"/>
+          </p:cNvSpPr>
+          <p:nvPr>
+            <p:ph type="title"/>
+          </p:nvPr>
+        </p:nvSpPr>
+        <p:spPr/>
+        <p:txBody>
+          <a:bodyPr/>
+          <a:lstStyle/>
+          <a:p>
+            <a:r>
+              <a:rPr lang="pt-BR" b="1" dirty="0"/>
               <a:t>Considerações ágeis</a:t>
             </a:r>
             <a:br>
@@ -6057,7 +6377,7 @@
 </p:sld>
 </file>
 
-<file path=ppt/slides/slide12.xml><?xml version="1.0" encoding="utf-8"?>
+<file path=ppt/slides/slide16.xml><?xml version="1.0" encoding="utf-8"?>
 <p:sld xmlns:a="http://schemas.openxmlformats.org/drawingml/2006/main" xmlns:r="http://schemas.openxmlformats.org/officeDocument/2006/relationships" xmlns:p="http://schemas.openxmlformats.org/presentationml/2006/main">
   <p:cSld>
     <p:spTree>
@@ -6315,47 +6635,84 @@
         </p:spPr>
         <p:txBody>
           <a:bodyPr>
-            <a:normAutofit/>
+            <a:normAutofit fontScale="70000" lnSpcReduction="20000"/>
           </a:bodyPr>
           <a:lstStyle/>
           <a:p>
-            <a:pPr marL="0" indent="0" algn="ctr">
+            <a:pPr marL="0" indent="0">
               <a:buNone/>
             </a:pPr>
             <a:r>
-              <a:rPr lang="pt-BR" sz="2400" dirty="0"/>
-              <a:t>O livro começa com uma cartilha sobre data </a:t>
-            </a:r>
-            <a:r>
-              <a:rPr lang="pt-BR" sz="2400" dirty="0" err="1"/>
+              <a:rPr lang="pt-BR" sz="2400" dirty="0" smtClean="0"/>
+              <a:t>Nesse começo encontrará uma cartilha sobre:</a:t>
+            </a:r>
+          </a:p>
+          <a:p>
+            <a:pPr marL="0" indent="0">
+              <a:buNone/>
+            </a:pPr>
+            <a:endParaRPr lang="pt-BR" sz="2400" dirty="0" smtClean="0"/>
+          </a:p>
+          <a:p>
+            <a:r>
+              <a:rPr lang="pt-BR" sz="2400" dirty="0" smtClean="0"/>
+              <a:t>data </a:t>
+            </a:r>
+            <a:r>
+              <a:rPr lang="pt-BR" sz="2400" dirty="0" err="1" smtClean="0"/>
               <a:t>warehousing</a:t>
             </a:r>
             <a:r>
-              <a:rPr lang="pt-BR" sz="2400" dirty="0"/>
-              <a:t>, business </a:t>
-            </a:r>
-            <a:r>
-              <a:rPr lang="pt-BR" sz="2400" dirty="0" err="1"/>
+              <a:rPr lang="pt-BR" sz="2400" dirty="0" smtClean="0"/>
+              <a:t>;</a:t>
+            </a:r>
+          </a:p>
+          <a:p>
+            <a:r>
+              <a:rPr lang="pt-BR" sz="2400" dirty="0" smtClean="0"/>
+              <a:t>business </a:t>
+            </a:r>
+            <a:r>
+              <a:rPr lang="pt-BR" sz="2400" dirty="0" err="1" smtClean="0"/>
               <a:t>intelligence</a:t>
             </a:r>
             <a:r>
-              <a:rPr lang="pt-BR" sz="2400" dirty="0"/>
-              <a:t> </a:t>
-            </a:r>
-            <a:r>
               <a:rPr lang="pt-BR" sz="2400" dirty="0" smtClean="0"/>
-              <a:t>e modelagem </a:t>
-            </a:r>
-            <a:r>
-              <a:rPr lang="pt-BR" sz="2400" dirty="0"/>
-              <a:t>dimensional. </a:t>
-            </a:r>
+              <a:t>; </a:t>
+            </a:r>
+          </a:p>
+          <a:p>
+            <a:r>
+              <a:rPr lang="pt-BR" sz="2400" dirty="0" smtClean="0"/>
+              <a:t>modelagem dimensional</a:t>
+            </a:r>
+            <a:r>
+              <a:rPr lang="pt-BR" sz="2400" dirty="0" smtClean="0"/>
+              <a:t>;</a:t>
+            </a:r>
+          </a:p>
+          <a:p>
+            <a:pPr marL="0" indent="0">
+              <a:buNone/>
+            </a:pPr>
             <a:endParaRPr lang="pt-BR" sz="2400" dirty="0" smtClean="0"/>
           </a:p>
           <a:p>
-            <a:pPr marL="0" indent="0" algn="ctr">
+            <a:pPr marL="0" indent="0">
               <a:buNone/>
             </a:pPr>
+            <a:r>
+              <a:rPr lang="pt-BR" sz="2400" dirty="0" smtClean="0"/>
+              <a:t>Alguns pontos encontrados:</a:t>
+            </a:r>
+          </a:p>
+          <a:p>
+            <a:pPr marL="0" indent="0">
+              <a:buNone/>
+            </a:pPr>
+            <a:endParaRPr lang="pt-BR" sz="2400" dirty="0" smtClean="0"/>
+          </a:p>
+          <a:p>
             <a:r>
               <a:rPr lang="pt-BR" sz="2400" dirty="0" smtClean="0"/>
               <a:t>Exploramos os </a:t>
@@ -6366,15 +6723,29 @@
             </a:r>
             <a:r>
               <a:rPr lang="pt-BR" sz="2400" dirty="0" smtClean="0"/>
-              <a:t>BI e </a:t>
+              <a:t>BI </a:t>
+            </a:r>
+            <a:endParaRPr lang="pt-BR" sz="2400" dirty="0" smtClean="0"/>
+          </a:p>
+          <a:p>
+            <a:r>
+              <a:rPr lang="pt-BR" sz="2400" dirty="0" smtClean="0"/>
+              <a:t>Estabelecer </a:t>
             </a:r>
             <a:r>
               <a:rPr lang="pt-BR" sz="2400" dirty="0"/>
-              <a:t>estabelecer o vocabulário central usado durante o restante do livro</a:t>
+              <a:t>o vocabulário central usado durante o restante do livro</a:t>
             </a:r>
             <a:r>
               <a:rPr lang="pt-BR" sz="2400" dirty="0" smtClean="0"/>
-              <a:t>. Alguns </a:t>
+              <a:t>. </a:t>
+            </a:r>
+            <a:endParaRPr lang="pt-BR" sz="2400" dirty="0" smtClean="0"/>
+          </a:p>
+          <a:p>
+            <a:r>
+              <a:rPr lang="pt-BR" sz="2400" dirty="0" smtClean="0"/>
+              <a:t>Alguns </a:t>
             </a:r>
             <a:r>
               <a:rPr lang="pt-BR" sz="2400" dirty="0"/>
@@ -6451,12 +6822,58 @@
             <p:ph idx="1"/>
           </p:nvPr>
         </p:nvSpPr>
-        <p:spPr/>
+        <p:spPr>
+          <a:xfrm>
+            <a:off x="677334" y="1930400"/>
+            <a:ext cx="8596668" cy="3880773"/>
+          </a:xfrm>
+        </p:spPr>
         <p:txBody>
           <a:bodyPr/>
           <a:lstStyle/>
           <a:p>
-            <a:endParaRPr lang="pt-BR"/>
+            <a:r>
+              <a:rPr lang="pt-BR" dirty="0"/>
+              <a:t>Um dos ativos mais importantes de qualquer organização é sua </a:t>
+            </a:r>
+            <a:r>
+              <a:rPr lang="pt-BR" dirty="0" smtClean="0"/>
+              <a:t>informação.</a:t>
+            </a:r>
+          </a:p>
+          <a:p>
+            <a:r>
+              <a:rPr lang="pt-BR" dirty="0"/>
+              <a:t>Este ativo é quase sempre usado para dois propósitos: </a:t>
+            </a:r>
+            <a:endParaRPr lang="pt-BR" dirty="0" smtClean="0"/>
+          </a:p>
+          <a:p>
+            <a:pPr lvl="1"/>
+            <a:r>
+              <a:rPr lang="pt-BR" dirty="0" smtClean="0"/>
+              <a:t>Manutenção </a:t>
+            </a:r>
+            <a:r>
+              <a:rPr lang="pt-BR" dirty="0"/>
+              <a:t>de registros </a:t>
+            </a:r>
+            <a:r>
+              <a:rPr lang="pt-BR" dirty="0" smtClean="0"/>
+              <a:t>operacionais</a:t>
+            </a:r>
+          </a:p>
+          <a:p>
+            <a:pPr lvl="1"/>
+            <a:r>
+              <a:rPr lang="pt-BR" dirty="0" smtClean="0"/>
+              <a:t>E análise </a:t>
+            </a:r>
+            <a:r>
+              <a:rPr lang="pt-BR" dirty="0"/>
+              <a:t>tomando uma decisão.</a:t>
+            </a:r>
+            <a:endParaRPr lang="pt-BR" dirty="0"/>
           </a:p>
         </p:txBody>
       </p:sp>
@@ -6549,7 +6966,58 @@
           <a:bodyPr/>
           <a:lstStyle/>
           <a:p>
-            <a:endParaRPr lang="pt-BR"/>
+            <a:pPr marL="0" indent="0">
+              <a:buNone/>
+            </a:pPr>
+            <a:r>
+              <a:rPr lang="pt-BR" dirty="0"/>
+              <a:t>Esses temas recorrentes existem há mais de três décadas:</a:t>
+            </a:r>
+          </a:p>
+          <a:p>
+            <a:pPr lvl="0"/>
+            <a:r>
+              <a:rPr lang="pt-BR" dirty="0"/>
+              <a:t>"Nós coletamos toneladas de dados, mas não podemos acessá-los."</a:t>
+            </a:r>
+          </a:p>
+          <a:p>
+            <a:pPr lvl="0"/>
+            <a:r>
+              <a:rPr lang="pt-BR" dirty="0"/>
+              <a:t>"Precisamos cortar e dividir os dados de todas as maneiras."</a:t>
+            </a:r>
+          </a:p>
+          <a:p>
+            <a:pPr lvl="0"/>
+            <a:r>
+              <a:rPr lang="pt-BR" dirty="0"/>
+              <a:t>"As pessoas de negócios precisam obter facilmente os dados".</a:t>
+            </a:r>
+          </a:p>
+          <a:p>
+            <a:pPr lvl="0"/>
+            <a:r>
+              <a:rPr lang="pt-BR" dirty="0"/>
+              <a:t>"Apenas me mostre o que é importante."</a:t>
+            </a:r>
+          </a:p>
+          <a:p>
+            <a:pPr lvl="0"/>
+            <a:r>
+              <a:rPr lang="pt-BR" dirty="0"/>
+              <a:t>"Passamos reuniões inteiras discutindo quem tem os números certos em vez de tomar decisões."</a:t>
+            </a:r>
+          </a:p>
+          <a:p>
+            <a:pPr lvl="0"/>
+            <a:r>
+              <a:rPr lang="pt-BR" dirty="0"/>
+              <a:t>"Queremos que as pessoas usem informações para apoiar tomadas de decisão mais baseadas em fatos."</a:t>
+            </a:r>
+          </a:p>
+          <a:p>
+            <a:endParaRPr lang="pt-BR" dirty="0"/>
           </a:p>
         </p:txBody>
       </p:sp>
@@ -6563,6 +7031,13 @@
   <p:clrMapOvr>
     <a:masterClrMapping/>
   </p:clrMapOvr>
+  <p:timing>
+    <p:tnLst>
+      <p:par>
+        <p:cTn id="1" dur="indefinite" restart="never" nodeType="tmRoot"/>
+      </p:par>
+    </p:tnLst>
+  </p:timing>
 </p:sld>
 </file>
 
@@ -6595,17 +7070,34 @@
         </p:nvSpPr>
         <p:spPr/>
         <p:txBody>
-          <a:bodyPr/>
+          <a:bodyPr>
+            <a:normAutofit fontScale="90000"/>
+          </a:bodyPr>
           <a:lstStyle/>
           <a:p>
             <a:r>
               <a:rPr lang="pt-BR" b="1" dirty="0"/>
-              <a:t>Introdução à Modelagem </a:t>
-            </a:r>
-            <a:r>
-              <a:rPr lang="pt-BR" b="1" dirty="0" smtClean="0"/>
-              <a:t>Dimensional</a:t>
-            </a:r>
+              <a:t>Objetivos do Data </a:t>
+            </a:r>
+            <a:r>
+              <a:rPr lang="pt-BR" b="1" dirty="0" err="1"/>
+              <a:t>Warehousing</a:t>
+            </a:r>
+            <a:r>
+              <a:rPr lang="pt-BR" b="1" dirty="0"/>
+              <a:t> e Business </a:t>
+            </a:r>
+            <a:r>
+              <a:rPr lang="pt-BR" b="1" dirty="0" err="1"/>
+              <a:t>Intelligence</a:t>
+            </a:r>
+            <a:r>
+              <a:rPr lang="pt-BR" b="1" dirty="0"/>
+              <a:t/>
+            </a:r>
+            <a:br>
+              <a:rPr lang="pt-BR" b="1" dirty="0"/>
+            </a:br>
             <a:endParaRPr lang="pt-BR" dirty="0"/>
           </a:p>
         </p:txBody>
@@ -6620,25 +7112,130 @@
             <p:ph idx="1"/>
           </p:nvPr>
         </p:nvSpPr>
-        <p:spPr/>
-        <p:txBody>
-          <a:bodyPr/>
-          <a:lstStyle/>
-          <a:p>
-            <a:endParaRPr lang="pt-BR"/>
+        <p:spPr>
+          <a:xfrm>
+            <a:off x="677334" y="2977227"/>
+            <a:ext cx="8596668" cy="3880773"/>
+          </a:xfrm>
+        </p:spPr>
+        <p:txBody>
+          <a:bodyPr>
+            <a:normAutofit/>
+          </a:bodyPr>
+          <a:lstStyle/>
+          <a:p>
+            <a:r>
+              <a:rPr lang="pt-BR" dirty="0" smtClean="0"/>
+              <a:t>O </a:t>
+            </a:r>
+            <a:r>
+              <a:rPr lang="pt-BR" dirty="0"/>
+              <a:t>sistema DW / BI deve tornar as informações facilmente acessíveis. </a:t>
+            </a:r>
+          </a:p>
+          <a:p>
+            <a:r>
+              <a:rPr lang="pt-BR" dirty="0"/>
+              <a:t>O sistema DW / BI deve apresentar informações de forma consistente.</a:t>
+            </a:r>
+          </a:p>
+          <a:p>
+            <a:r>
+              <a:rPr lang="pt-BR" dirty="0"/>
+              <a:t>O sistema DW / BI deve se adaptar à mudança. </a:t>
+            </a:r>
+          </a:p>
+          <a:p>
+            <a:r>
+              <a:rPr lang="pt-BR" dirty="0"/>
+              <a:t>O sistema DW / BI deve apresentar informações em tempo hábil. </a:t>
+            </a:r>
+          </a:p>
+          <a:p>
+            <a:r>
+              <a:rPr lang="pt-BR" dirty="0"/>
+              <a:t>O sistema DW / BI deve ser um bastião seguro que proteja os ativos de informação. </a:t>
+            </a:r>
+          </a:p>
+          <a:p>
+            <a:r>
+              <a:rPr lang="pt-BR" dirty="0"/>
+              <a:t>O sistema DW / BI deve servir como base </a:t>
+            </a:r>
+            <a:r>
+              <a:rPr lang="pt-BR" dirty="0" err="1"/>
+              <a:t>autoritativa</a:t>
+            </a:r>
+            <a:r>
+              <a:rPr lang="pt-BR" dirty="0"/>
+              <a:t> e confiável para melhorar a tomada de </a:t>
+            </a:r>
+            <a:r>
+              <a:rPr lang="pt-BR" dirty="0" smtClean="0"/>
+              <a:t>decisões</a:t>
+            </a:r>
+            <a:r>
+              <a:rPr lang="pt-BR" dirty="0"/>
+              <a:t>.</a:t>
+            </a:r>
+          </a:p>
+          <a:p>
+            <a:r>
+              <a:rPr lang="pt-BR" dirty="0"/>
+              <a:t>A comunidade empresarial deve aceitar o sistema DW / BI para considerá-lo bem-sucedido.</a:t>
+            </a:r>
+          </a:p>
+          <a:p>
+            <a:endParaRPr lang="pt-BR" dirty="0"/>
+          </a:p>
+        </p:txBody>
+      </p:sp>
+      <p:sp>
+        <p:nvSpPr>
+          <p:cNvPr id="4" name="Retângulo 3"/>
+          <p:cNvSpPr/>
+          <p:nvPr/>
+        </p:nvSpPr>
+        <p:spPr>
+          <a:xfrm>
+            <a:off x="677334" y="1930400"/>
+            <a:ext cx="8821508" cy="923330"/>
+          </a:xfrm>
+          <a:prstGeom prst="rect">
+            <a:avLst/>
+          </a:prstGeom>
+        </p:spPr>
+        <p:txBody>
+          <a:bodyPr wrap="square">
+            <a:spAutoFit/>
+          </a:bodyPr>
+          <a:lstStyle/>
+          <a:p>
+            <a:r>
+              <a:rPr lang="pt-BR" dirty="0"/>
+              <a:t>Com base em nossa experiência, essas preocupações ainda são tão universais que conduzem os requisitos básicos para o sistema DW / BI. Agora, transforme essas cotações de gerenciamento de negócios em requisitos:</a:t>
+            </a:r>
+            <a:endParaRPr lang="pt-BR" dirty="0"/>
           </a:p>
         </p:txBody>
       </p:sp>
     </p:spTree>
     <p:extLst>
       <p:ext uri="{BB962C8B-B14F-4D97-AF65-F5344CB8AC3E}">
-        <p14:creationId xmlns:p14="http://schemas.microsoft.com/office/powerpoint/2010/main" val="2232287699"/>
+        <p14:creationId xmlns:p14="http://schemas.microsoft.com/office/powerpoint/2010/main" val="1951658826"/>
       </p:ext>
     </p:extLst>
   </p:cSld>
   <p:clrMapOvr>
     <a:masterClrMapping/>
   </p:clrMapOvr>
+  <p:timing>
+    <p:tnLst>
+      <p:par>
+        <p:cTn id="1" dur="indefinite" restart="never" nodeType="tmRoot"/>
+      </p:par>
+    </p:tnLst>
+  </p:timing>
 </p:sld>
 </file>
 
@@ -6669,59 +7266,257 @@
             <p:ph type="title"/>
           </p:nvPr>
         </p:nvSpPr>
-        <p:spPr/>
-        <p:txBody>
-          <a:bodyPr/>
-          <a:lstStyle/>
-          <a:p>
-            <a:r>
-              <a:rPr lang="pt-BR" b="1" dirty="0"/>
-              <a:t>Arquitetura DW / BI de </a:t>
-            </a:r>
-            <a:r>
-              <a:rPr lang="pt-BR" b="1" dirty="0" err="1"/>
-              <a:t>Kimball</a:t>
-            </a:r>
-            <a:r>
-              <a:rPr lang="pt-BR" b="1" dirty="0"/>
+        <p:spPr>
+          <a:xfrm>
+            <a:off x="677333" y="609600"/>
+            <a:ext cx="9694966" cy="1320800"/>
+          </a:xfrm>
+        </p:spPr>
+        <p:txBody>
+          <a:bodyPr>
+            <a:noAutofit/>
+          </a:bodyPr>
+          <a:lstStyle/>
+          <a:p>
+            <a:r>
+              <a:rPr lang="pt-BR" sz="2400" b="1" dirty="0"/>
+              <a:t>Objetivos do Data </a:t>
+            </a:r>
+            <a:r>
+              <a:rPr lang="pt-BR" sz="2400" b="1" dirty="0" err="1"/>
+              <a:t>Warehousing</a:t>
+            </a:r>
+            <a:r>
+              <a:rPr lang="pt-BR" sz="2400" b="1" dirty="0"/>
+              <a:t> e </a:t>
+            </a:r>
+            <a:r>
+              <a:rPr lang="pt-BR" sz="2400" b="1" dirty="0" smtClean="0"/>
+              <a:t>Business </a:t>
+            </a:r>
+            <a:r>
+              <a:rPr lang="pt-BR" sz="2400" b="1" dirty="0" err="1" smtClean="0"/>
+              <a:t>Intelligence</a:t>
+            </a:r>
+            <a:r>
+              <a:rPr lang="pt-BR" sz="2400" b="1" dirty="0" smtClean="0"/>
+              <a:t> –</a:t>
+            </a:r>
+            <a:br>
+              <a:rPr lang="pt-BR" sz="2400" b="1" dirty="0" smtClean="0"/>
+            </a:br>
+            <a:r>
+              <a:rPr lang="pt-BR" sz="2400" b="1" dirty="0" smtClean="0"/>
+              <a:t>Publicação </a:t>
+            </a:r>
+            <a:r>
+              <a:rPr lang="pt-BR" sz="2400" b="1" dirty="0"/>
+              <a:t>de Metáfora para Gerentes de DW / BI</a:t>
+            </a:r>
+            <a:br>
+              <a:rPr lang="pt-BR" sz="2400" b="1" dirty="0"/>
+            </a:br>
+            <a:r>
+              <a:rPr lang="pt-BR" sz="2400" b="1" dirty="0"/>
               <a:t/>
             </a:r>
             <a:br>
-              <a:rPr lang="pt-BR" b="1" dirty="0"/>
+              <a:rPr lang="pt-BR" sz="2400" b="1" dirty="0"/>
             </a:br>
+            <a:endParaRPr lang="pt-BR" sz="2400" dirty="0"/>
+          </a:p>
+        </p:txBody>
+      </p:sp>
+      <p:pic>
+        <p:nvPicPr>
+          <p:cNvPr id="6" name="Imagem 5"/>
+          <p:cNvPicPr>
+            <a:picLocks noChangeAspect="1"/>
+          </p:cNvPicPr>
+          <p:nvPr/>
+        </p:nvPicPr>
+        <p:blipFill rotWithShape="1">
+          <a:blip r:embed="rId2" cstate="print">
+            <a:extLst>
+              <a:ext uri="{28A0092B-C50C-407E-A947-70E740481C1C}">
+                <a14:useLocalDpi xmlns:a14="http://schemas.microsoft.com/office/drawing/2010/main" val="0"/>
+              </a:ext>
+            </a:extLst>
+          </a:blip>
+          <a:srcRect b="9928"/>
+          <a:stretch/>
+        </p:blipFill>
+        <p:spPr>
+          <a:xfrm>
+            <a:off x="464725" y="2928034"/>
+            <a:ext cx="4079980" cy="2459369"/>
+          </a:xfrm>
+          <a:prstGeom prst="rect">
+            <a:avLst/>
+          </a:prstGeom>
+        </p:spPr>
+      </p:pic>
+      <p:pic>
+        <p:nvPicPr>
+          <p:cNvPr id="7" name="Imagem 6"/>
+          <p:cNvPicPr>
+            <a:picLocks noChangeAspect="1"/>
+          </p:cNvPicPr>
+          <p:nvPr/>
+        </p:nvPicPr>
+        <p:blipFill rotWithShape="1">
+          <a:blip r:embed="rId3" cstate="print">
+            <a:extLst>
+              <a:ext uri="{28A0092B-C50C-407E-A947-70E740481C1C}">
+                <a14:useLocalDpi xmlns:a14="http://schemas.microsoft.com/office/drawing/2010/main" val="0"/>
+              </a:ext>
+            </a:extLst>
+          </a:blip>
+          <a:srcRect b="9076"/>
+          <a:stretch/>
+        </p:blipFill>
+        <p:spPr>
+          <a:xfrm>
+            <a:off x="5836187" y="2933132"/>
+            <a:ext cx="3689951" cy="2449171"/>
+          </a:xfrm>
+          <a:prstGeom prst="rect">
+            <a:avLst/>
+          </a:prstGeom>
+        </p:spPr>
+      </p:pic>
+      <p:sp>
+        <p:nvSpPr>
+          <p:cNvPr id="8" name="Retângulo 7"/>
+          <p:cNvSpPr/>
+          <p:nvPr/>
+        </p:nvSpPr>
+        <p:spPr>
+          <a:xfrm>
+            <a:off x="677333" y="1607234"/>
+            <a:ext cx="6096000" cy="646331"/>
+          </a:xfrm>
+          <a:prstGeom prst="rect">
+            <a:avLst/>
+          </a:prstGeom>
+        </p:spPr>
+        <p:txBody>
+          <a:bodyPr>
+            <a:spAutoFit/>
+          </a:bodyPr>
+          <a:lstStyle/>
+          <a:p>
+            <a:r>
+              <a:rPr lang="pt-BR" dirty="0"/>
+              <a:t>Com os objetivos do DW / BI como pano de fundo, vamos comparar as </a:t>
+            </a:r>
+            <a:r>
+              <a:rPr lang="pt-BR" dirty="0" smtClean="0"/>
+              <a:t>responsabilidades:</a:t>
+            </a:r>
             <a:endParaRPr lang="pt-BR" dirty="0"/>
           </a:p>
         </p:txBody>
       </p:sp>
       <p:sp>
         <p:nvSpPr>
-          <p:cNvPr id="3" name="Espaço Reservado para Conteúdo 2"/>
-          <p:cNvSpPr>
-            <a:spLocks noGrp="1"/>
-          </p:cNvSpPr>
-          <p:nvPr>
-            <p:ph idx="1"/>
-          </p:nvPr>
-        </p:nvSpPr>
-        <p:spPr/>
-        <p:txBody>
-          <a:bodyPr/>
-          <a:lstStyle/>
-          <a:p>
-            <a:endParaRPr lang="pt-BR"/>
+          <p:cNvPr id="9" name="Retângulo 8"/>
+          <p:cNvSpPr/>
+          <p:nvPr/>
+        </p:nvSpPr>
+        <p:spPr>
+          <a:xfrm>
+            <a:off x="1330007" y="2558702"/>
+            <a:ext cx="2158348" cy="369332"/>
+          </a:xfrm>
+          <a:prstGeom prst="rect">
+            <a:avLst/>
+          </a:prstGeom>
+        </p:spPr>
+        <p:txBody>
+          <a:bodyPr wrap="none">
+            <a:spAutoFit/>
+          </a:bodyPr>
+          <a:lstStyle/>
+          <a:p>
+            <a:r>
+              <a:rPr lang="pt-BR" dirty="0" smtClean="0">
+                <a:latin typeface="Calibri" panose="020F0502020204030204" pitchFamily="34" charset="0"/>
+                <a:ea typeface="Calibri" panose="020F0502020204030204" pitchFamily="34" charset="0"/>
+                <a:cs typeface="Times New Roman" panose="02020603050405020304" pitchFamily="18" charset="0"/>
+              </a:rPr>
+              <a:t>Gerentes </a:t>
+            </a:r>
+            <a:r>
+              <a:rPr lang="pt-BR" dirty="0">
+                <a:latin typeface="Calibri" panose="020F0502020204030204" pitchFamily="34" charset="0"/>
+                <a:ea typeface="Calibri" panose="020F0502020204030204" pitchFamily="34" charset="0"/>
+                <a:cs typeface="Times New Roman" panose="02020603050405020304" pitchFamily="18" charset="0"/>
+              </a:rPr>
+              <a:t>de DW / BI </a:t>
+            </a:r>
+            <a:endParaRPr lang="pt-BR" dirty="0"/>
+          </a:p>
+        </p:txBody>
+      </p:sp>
+      <p:sp>
+        <p:nvSpPr>
+          <p:cNvPr id="10" name="Retângulo 9"/>
+          <p:cNvSpPr/>
+          <p:nvPr/>
+        </p:nvSpPr>
+        <p:spPr>
+          <a:xfrm>
+            <a:off x="6588843" y="2561734"/>
+            <a:ext cx="2178032" cy="369332"/>
+          </a:xfrm>
+          <a:prstGeom prst="rect">
+            <a:avLst/>
+          </a:prstGeom>
+        </p:spPr>
+        <p:txBody>
+          <a:bodyPr wrap="none">
+            <a:spAutoFit/>
+          </a:bodyPr>
+          <a:lstStyle/>
+          <a:p>
+            <a:r>
+              <a:rPr lang="pt-BR" dirty="0" smtClean="0">
+                <a:latin typeface="Calibri" panose="020F0502020204030204" pitchFamily="34" charset="0"/>
+                <a:ea typeface="Calibri" panose="020F0502020204030204" pitchFamily="34" charset="0"/>
+                <a:cs typeface="Times New Roman" panose="02020603050405020304" pitchFamily="18" charset="0"/>
+              </a:rPr>
+              <a:t>Editor </a:t>
+            </a:r>
+            <a:r>
+              <a:rPr lang="pt-BR" dirty="0">
+                <a:latin typeface="Calibri" panose="020F0502020204030204" pitchFamily="34" charset="0"/>
+                <a:ea typeface="Calibri" panose="020F0502020204030204" pitchFamily="34" charset="0"/>
+                <a:cs typeface="Times New Roman" panose="02020603050405020304" pitchFamily="18" charset="0"/>
+              </a:rPr>
+              <a:t>de uma revista</a:t>
+            </a:r>
+            <a:endParaRPr lang="pt-BR" dirty="0"/>
           </a:p>
         </p:txBody>
       </p:sp>
     </p:spTree>
     <p:extLst>
       <p:ext uri="{BB962C8B-B14F-4D97-AF65-F5344CB8AC3E}">
-        <p14:creationId xmlns:p14="http://schemas.microsoft.com/office/powerpoint/2010/main" val="907617143"/>
+        <p14:creationId xmlns:p14="http://schemas.microsoft.com/office/powerpoint/2010/main" val="4092537143"/>
       </p:ext>
     </p:extLst>
   </p:cSld>
   <p:clrMapOvr>
     <a:masterClrMapping/>
   </p:clrMapOvr>
+  <p:timing>
+    <p:tnLst>
+      <p:par>
+        <p:cTn id="1" dur="indefinite" restart="never" nodeType="tmRoot"/>
+      </p:par>
+    </p:tnLst>
+  </p:timing>
 </p:sld>
 </file>
 
@@ -6752,51 +7547,543 @@
             <p:ph type="title"/>
           </p:nvPr>
         </p:nvSpPr>
-        <p:spPr/>
-        <p:txBody>
-          <a:bodyPr/>
-          <a:lstStyle/>
-          <a:p>
-            <a:r>
-              <a:rPr lang="pt-BR" b="1" dirty="0"/>
-              <a:t>Arquiteturas alternativas DW / BI</a:t>
+        <p:spPr>
+          <a:xfrm>
+            <a:off x="677333" y="609600"/>
+            <a:ext cx="9694966" cy="1320800"/>
+          </a:xfrm>
+        </p:spPr>
+        <p:txBody>
+          <a:bodyPr>
+            <a:noAutofit/>
+          </a:bodyPr>
+          <a:lstStyle/>
+          <a:p>
+            <a:r>
+              <a:rPr lang="pt-BR" sz="2400" b="1" dirty="0"/>
+              <a:t>Objetivos do Data </a:t>
+            </a:r>
+            <a:r>
+              <a:rPr lang="pt-BR" sz="2400" b="1" dirty="0" err="1"/>
+              <a:t>Warehousing</a:t>
+            </a:r>
+            <a:r>
+              <a:rPr lang="pt-BR" sz="2400" b="1" dirty="0"/>
+              <a:t> e </a:t>
+            </a:r>
+            <a:r>
+              <a:rPr lang="pt-BR" sz="2400" b="1" dirty="0" smtClean="0"/>
+              <a:t>Business </a:t>
+            </a:r>
+            <a:r>
+              <a:rPr lang="pt-BR" sz="2400" b="1" dirty="0" err="1" smtClean="0"/>
+              <a:t>Intelligence</a:t>
+            </a:r>
+            <a:r>
+              <a:rPr lang="pt-BR" sz="2400" b="1" dirty="0" smtClean="0"/>
+              <a:t> –</a:t>
             </a:r>
             <a:br>
-              <a:rPr lang="pt-BR" b="1" dirty="0"/>
+              <a:rPr lang="pt-BR" sz="2400" b="1" dirty="0" smtClean="0"/>
             </a:br>
-            <a:endParaRPr lang="pt-BR" dirty="0"/>
-          </a:p>
-        </p:txBody>
-      </p:sp>
-      <p:sp>
-        <p:nvSpPr>
-          <p:cNvPr id="3" name="Espaço Reservado para Conteúdo 2"/>
-          <p:cNvSpPr>
-            <a:spLocks noGrp="1"/>
-          </p:cNvSpPr>
-          <p:nvPr>
-            <p:ph idx="1"/>
-          </p:nvPr>
-        </p:nvSpPr>
-        <p:spPr/>
-        <p:txBody>
-          <a:bodyPr/>
-          <a:lstStyle/>
-          <a:p>
-            <a:endParaRPr lang="pt-BR"/>
+            <a:r>
+              <a:rPr lang="pt-BR" sz="2400" b="1" dirty="0" smtClean="0"/>
+              <a:t>Publicação </a:t>
+            </a:r>
+            <a:r>
+              <a:rPr lang="pt-BR" sz="2400" b="1" dirty="0"/>
+              <a:t>de Metáfora para Gerentes de DW / BI</a:t>
+            </a:r>
+            <a:br>
+              <a:rPr lang="pt-BR" sz="2400" b="1" dirty="0"/>
+            </a:br>
+            <a:r>
+              <a:rPr lang="pt-BR" sz="2400" b="1" dirty="0"/>
+              <a:t/>
+            </a:r>
+            <a:br>
+              <a:rPr lang="pt-BR" sz="2400" b="1" dirty="0"/>
+            </a:br>
+            <a:endParaRPr lang="pt-BR" sz="2400" dirty="0"/>
+          </a:p>
+        </p:txBody>
+      </p:sp>
+      <p:pic>
+        <p:nvPicPr>
+          <p:cNvPr id="7" name="Imagem 6"/>
+          <p:cNvPicPr>
+            <a:picLocks noChangeAspect="1"/>
+          </p:cNvPicPr>
+          <p:nvPr/>
+        </p:nvPicPr>
+        <p:blipFill rotWithShape="1">
+          <a:blip r:embed="rId2" cstate="print">
+            <a:extLst>
+              <a:ext uri="{28A0092B-C50C-407E-A947-70E740481C1C}">
+                <a14:useLocalDpi xmlns:a14="http://schemas.microsoft.com/office/drawing/2010/main" val="0"/>
+              </a:ext>
+            </a:extLst>
+          </a:blip>
+          <a:srcRect b="9076"/>
+          <a:stretch/>
+        </p:blipFill>
+        <p:spPr>
+          <a:xfrm>
+            <a:off x="7287904" y="1607234"/>
+            <a:ext cx="1883391" cy="1250083"/>
+          </a:xfrm>
+          <a:prstGeom prst="rect">
+            <a:avLst/>
+          </a:prstGeom>
+        </p:spPr>
+      </p:pic>
+      <p:sp>
+        <p:nvSpPr>
+          <p:cNvPr id="8" name="Retângulo 7"/>
+          <p:cNvSpPr/>
+          <p:nvPr/>
+        </p:nvSpPr>
+        <p:spPr>
+          <a:xfrm>
+            <a:off x="677333" y="1511698"/>
+            <a:ext cx="6096000" cy="1200329"/>
+          </a:xfrm>
+          <a:prstGeom prst="rect">
+            <a:avLst/>
+          </a:prstGeom>
+        </p:spPr>
+        <p:txBody>
+          <a:bodyPr>
+            <a:spAutoFit/>
+          </a:bodyPr>
+          <a:lstStyle/>
+          <a:p>
+            <a:r>
+              <a:rPr lang="pt-BR" dirty="0"/>
+              <a:t>Como editor de uma revista de alta qualidade, você teria ampla liberdade para gerenciar o conteúdo, o estilo e a entrega da revista. Qualquer pessoa com esse cargo provavelmente abordaria as seguintes atividades:</a:t>
+            </a:r>
+          </a:p>
+        </p:txBody>
+      </p:sp>
+      <p:sp>
+        <p:nvSpPr>
+          <p:cNvPr id="3" name="Retângulo 2"/>
+          <p:cNvSpPr/>
+          <p:nvPr/>
+        </p:nvSpPr>
+        <p:spPr>
+          <a:xfrm>
+            <a:off x="627797" y="2807563"/>
+            <a:ext cx="10181230" cy="4011034"/>
+          </a:xfrm>
+          <a:prstGeom prst="rect">
+            <a:avLst/>
+          </a:prstGeom>
+        </p:spPr>
+        <p:txBody>
+          <a:bodyPr wrap="square">
+            <a:spAutoFit/>
+          </a:bodyPr>
+          <a:lstStyle/>
+          <a:p>
+            <a:pPr marL="342900" lvl="0" indent="-342900" algn="just">
+              <a:lnSpc>
+                <a:spcPct val="107000"/>
+              </a:lnSpc>
+              <a:spcAft>
+                <a:spcPts val="0"/>
+              </a:spcAft>
+              <a:buFont typeface="Symbol" panose="05050102010706020507" pitchFamily="18" charset="2"/>
+              <a:buChar char=""/>
+            </a:pPr>
+            <a:r>
+              <a:rPr lang="pt-BR" sz="1400" dirty="0">
+                <a:latin typeface="BerkeleyStd-Medium"/>
+                <a:ea typeface="Calibri" panose="020F0502020204030204" pitchFamily="34" charset="0"/>
+                <a:cs typeface="BerkeleyStd-Medium"/>
+              </a:rPr>
+              <a:t>Entenda os leitores:</a:t>
+            </a:r>
+          </a:p>
+          <a:p>
+            <a:pPr marL="742950" lvl="1" indent="-285750" algn="just">
+              <a:lnSpc>
+                <a:spcPct val="107000"/>
+              </a:lnSpc>
+              <a:spcAft>
+                <a:spcPts val="0"/>
+              </a:spcAft>
+              <a:buFont typeface="Courier New" panose="02070309020205020404" pitchFamily="49" charset="0"/>
+              <a:buChar char="o"/>
+            </a:pPr>
+            <a:r>
+              <a:rPr lang="pt-BR" sz="1400" dirty="0">
+                <a:latin typeface="BerkeleyStd-Medium"/>
+                <a:ea typeface="Calibri" panose="020F0502020204030204" pitchFamily="34" charset="0"/>
+                <a:cs typeface="BerkeleyStd-Medium"/>
+              </a:rPr>
+              <a:t>Identifique suas características demográficas.</a:t>
+            </a:r>
+          </a:p>
+          <a:p>
+            <a:pPr marL="742950" lvl="1" indent="-285750" algn="just">
+              <a:lnSpc>
+                <a:spcPct val="107000"/>
+              </a:lnSpc>
+              <a:spcAft>
+                <a:spcPts val="0"/>
+              </a:spcAft>
+              <a:buFont typeface="Courier New" panose="02070309020205020404" pitchFamily="49" charset="0"/>
+              <a:buChar char="o"/>
+            </a:pPr>
+            <a:r>
+              <a:rPr lang="pt-BR" sz="1400" dirty="0">
+                <a:latin typeface="BerkeleyStd-Medium"/>
+                <a:ea typeface="Calibri" panose="020F0502020204030204" pitchFamily="34" charset="0"/>
+                <a:cs typeface="BerkeleyStd-Medium"/>
+              </a:rPr>
+              <a:t>Descubra o que os leitores querem neste tipo de revista.</a:t>
+            </a:r>
+          </a:p>
+          <a:p>
+            <a:pPr marL="742950" lvl="1" indent="-285750" algn="just">
+              <a:lnSpc>
+                <a:spcPct val="107000"/>
+              </a:lnSpc>
+              <a:spcAft>
+                <a:spcPts val="0"/>
+              </a:spcAft>
+              <a:buFont typeface="Courier New" panose="02070309020205020404" pitchFamily="49" charset="0"/>
+              <a:buChar char="o"/>
+            </a:pPr>
+            <a:r>
+              <a:rPr lang="pt-BR" sz="1400" dirty="0">
+                <a:latin typeface="BerkeleyStd-Medium"/>
+                <a:ea typeface="Calibri" panose="020F0502020204030204" pitchFamily="34" charset="0"/>
+                <a:cs typeface="BerkeleyStd-Medium"/>
+              </a:rPr>
+              <a:t>Identifique os "melhores" leitores que renovarão suas assinaturas e comprarão produtos dos anunciantes da revista.</a:t>
+            </a:r>
+          </a:p>
+          <a:p>
+            <a:pPr marL="742950" lvl="1" indent="-285750" algn="just">
+              <a:lnSpc>
+                <a:spcPct val="107000"/>
+              </a:lnSpc>
+              <a:spcAft>
+                <a:spcPts val="0"/>
+              </a:spcAft>
+              <a:buFont typeface="Courier New" panose="02070309020205020404" pitchFamily="49" charset="0"/>
+              <a:buChar char="o"/>
+            </a:pPr>
+            <a:r>
+              <a:rPr lang="pt-BR" sz="1400" dirty="0">
+                <a:latin typeface="BerkeleyStd-Medium"/>
+                <a:ea typeface="Calibri" panose="020F0502020204030204" pitchFamily="34" charset="0"/>
+                <a:cs typeface="BerkeleyStd-Medium"/>
+              </a:rPr>
+              <a:t>Encontre potenciais novos leitores e torne-os cientes da revista.</a:t>
+            </a:r>
+          </a:p>
+          <a:p>
+            <a:pPr marL="342900" lvl="0" indent="-342900" algn="just">
+              <a:lnSpc>
+                <a:spcPct val="107000"/>
+              </a:lnSpc>
+              <a:spcAft>
+                <a:spcPts val="0"/>
+              </a:spcAft>
+              <a:buFont typeface="Symbol" panose="05050102010706020507" pitchFamily="18" charset="2"/>
+              <a:buChar char=""/>
+            </a:pPr>
+            <a:r>
+              <a:rPr lang="pt-BR" sz="1400" dirty="0">
+                <a:latin typeface="BerkeleyStd-Medium"/>
+                <a:ea typeface="Calibri" panose="020F0502020204030204" pitchFamily="34" charset="0"/>
+                <a:cs typeface="BerkeleyStd-Medium"/>
+              </a:rPr>
+              <a:t>Garanta que a revista agrade aos leitores:</a:t>
+            </a:r>
+          </a:p>
+          <a:p>
+            <a:pPr marL="742950" lvl="1" indent="-285750" algn="just">
+              <a:lnSpc>
+                <a:spcPct val="107000"/>
+              </a:lnSpc>
+              <a:spcAft>
+                <a:spcPts val="0"/>
+              </a:spcAft>
+              <a:buFont typeface="Courier New" panose="02070309020205020404" pitchFamily="49" charset="0"/>
+              <a:buChar char="o"/>
+            </a:pPr>
+            <a:r>
+              <a:rPr lang="pt-BR" sz="1400" dirty="0">
+                <a:latin typeface="BerkeleyStd-Medium"/>
+                <a:ea typeface="Calibri" panose="020F0502020204030204" pitchFamily="34" charset="0"/>
+                <a:cs typeface="BerkeleyStd-Medium"/>
+              </a:rPr>
+              <a:t>Escolha conteúdo de revista interessante e atraente.</a:t>
+            </a:r>
+          </a:p>
+          <a:p>
+            <a:pPr marL="742950" lvl="1" indent="-285750" algn="just">
+              <a:lnSpc>
+                <a:spcPct val="107000"/>
+              </a:lnSpc>
+              <a:spcAft>
+                <a:spcPts val="0"/>
+              </a:spcAft>
+              <a:buFont typeface="Courier New" panose="02070309020205020404" pitchFamily="49" charset="0"/>
+              <a:buChar char="o"/>
+            </a:pPr>
+            <a:r>
+              <a:rPr lang="pt-BR" sz="1400" dirty="0">
+                <a:latin typeface="BerkeleyStd-Medium"/>
+                <a:ea typeface="Calibri" panose="020F0502020204030204" pitchFamily="34" charset="0"/>
+                <a:cs typeface="BerkeleyStd-Medium"/>
+              </a:rPr>
+              <a:t>Tome decisões de layout e </a:t>
+            </a:r>
+            <a:r>
+              <a:rPr lang="pt-BR" sz="1400" dirty="0" err="1">
+                <a:latin typeface="BerkeleyStd-Medium"/>
+                <a:ea typeface="Calibri" panose="020F0502020204030204" pitchFamily="34" charset="0"/>
+                <a:cs typeface="BerkeleyStd-Medium"/>
+              </a:rPr>
+              <a:t>renderização</a:t>
+            </a:r>
+            <a:r>
+              <a:rPr lang="pt-BR" sz="1400" dirty="0">
+                <a:latin typeface="BerkeleyStd-Medium"/>
+                <a:ea typeface="Calibri" panose="020F0502020204030204" pitchFamily="34" charset="0"/>
+                <a:cs typeface="BerkeleyStd-Medium"/>
+              </a:rPr>
+              <a:t> que maximizem o prazer dos leitores.</a:t>
+            </a:r>
+          </a:p>
+          <a:p>
+            <a:pPr marL="742950" lvl="1" indent="-285750" algn="just">
+              <a:lnSpc>
+                <a:spcPct val="107000"/>
+              </a:lnSpc>
+              <a:spcAft>
+                <a:spcPts val="0"/>
+              </a:spcAft>
+              <a:buFont typeface="Courier New" panose="02070309020205020404" pitchFamily="49" charset="0"/>
+              <a:buChar char="o"/>
+            </a:pPr>
+            <a:r>
+              <a:rPr lang="pt-BR" sz="1400" dirty="0">
+                <a:latin typeface="BerkeleyStd-Medium"/>
+                <a:ea typeface="Calibri" panose="020F0502020204030204" pitchFamily="34" charset="0"/>
+                <a:cs typeface="BerkeleyStd-Medium"/>
+              </a:rPr>
+              <a:t>Defenda padrões de escrita e edição de alta qualidade enquanto </a:t>
+            </a:r>
+            <a:r>
+              <a:rPr lang="pt-BR" sz="1400" dirty="0">
+                <a:latin typeface="BerkeleyStd-Medium"/>
+                <a:ea typeface="Calibri" panose="020F0502020204030204" pitchFamily="34" charset="0"/>
+                <a:cs typeface="BerkeleyStd-Medium"/>
+              </a:rPr>
+              <a:t>adota um estilo de apresentação consistente.</a:t>
+            </a:r>
+            <a:endParaRPr lang="pt-BR" sz="1200" dirty="0">
+              <a:latin typeface="Calibri" panose="020F0502020204030204" pitchFamily="34" charset="0"/>
+              <a:ea typeface="Calibri" panose="020F0502020204030204" pitchFamily="34" charset="0"/>
+              <a:cs typeface="Times New Roman" panose="02020603050405020304" pitchFamily="18" charset="0"/>
+            </a:endParaRPr>
+          </a:p>
+          <a:p>
+            <a:pPr marL="742950" lvl="1" indent="-285750" algn="just">
+              <a:lnSpc>
+                <a:spcPct val="107000"/>
+              </a:lnSpc>
+              <a:spcAft>
+                <a:spcPts val="0"/>
+              </a:spcAft>
+              <a:buFont typeface="Courier New" panose="02070309020205020404" pitchFamily="49" charset="0"/>
+              <a:buChar char="o"/>
+            </a:pPr>
+            <a:r>
+              <a:rPr lang="pt-BR" sz="1400" dirty="0">
+                <a:latin typeface="BerkeleyStd-Medium"/>
+                <a:ea typeface="Calibri" panose="020F0502020204030204" pitchFamily="34" charset="0"/>
+                <a:cs typeface="BerkeleyStd-Medium"/>
+              </a:rPr>
+              <a:t>Monitore continuamente a precisão dos artigos e das reivindicações dos anunciantes.</a:t>
+            </a:r>
+            <a:endParaRPr lang="pt-BR" sz="1200" dirty="0">
+              <a:latin typeface="Calibri" panose="020F0502020204030204" pitchFamily="34" charset="0"/>
+              <a:ea typeface="Calibri" panose="020F0502020204030204" pitchFamily="34" charset="0"/>
+              <a:cs typeface="Times New Roman" panose="02020603050405020304" pitchFamily="18" charset="0"/>
+            </a:endParaRPr>
+          </a:p>
+          <a:p>
+            <a:pPr marL="742950" lvl="1" indent="-285750" algn="just">
+              <a:lnSpc>
+                <a:spcPct val="107000"/>
+              </a:lnSpc>
+              <a:spcAft>
+                <a:spcPts val="0"/>
+              </a:spcAft>
+              <a:buFont typeface="Courier New" panose="02070309020205020404" pitchFamily="49" charset="0"/>
+              <a:buChar char="o"/>
+            </a:pPr>
+            <a:r>
+              <a:rPr lang="pt-BR" sz="1400" dirty="0">
+                <a:latin typeface="BerkeleyStd-Medium"/>
+                <a:ea typeface="Calibri" panose="020F0502020204030204" pitchFamily="34" charset="0"/>
+                <a:cs typeface="BerkeleyStd-Medium"/>
+              </a:rPr>
+              <a:t>Adapte-se à mudança de perfis de leitores e à disponibilidade de novas entradas de uma rede de escritores e colaboradores. </a:t>
+            </a:r>
+          </a:p>
+          <a:p>
+            <a:pPr marL="342900" lvl="0" indent="-342900" algn="just">
+              <a:lnSpc>
+                <a:spcPct val="107000"/>
+              </a:lnSpc>
+              <a:spcAft>
+                <a:spcPts val="0"/>
+              </a:spcAft>
+              <a:buFont typeface="Symbol" panose="05050102010706020507" pitchFamily="18" charset="2"/>
+              <a:buChar char=""/>
+            </a:pPr>
+            <a:r>
+              <a:rPr lang="pt-BR" sz="1400" dirty="0" smtClean="0">
+                <a:latin typeface="BerkeleyStd-Medium"/>
+                <a:ea typeface="Calibri" panose="020F0502020204030204" pitchFamily="34" charset="0"/>
+                <a:cs typeface="BerkeleyStd-Medium"/>
+              </a:rPr>
+              <a:t>Sustentar a publicação:</a:t>
+            </a:r>
+            <a:endParaRPr lang="pt-BR" sz="1200" dirty="0" smtClean="0">
+              <a:latin typeface="Calibri" panose="020F0502020204030204" pitchFamily="34" charset="0"/>
+              <a:ea typeface="Calibri" panose="020F0502020204030204" pitchFamily="34" charset="0"/>
+              <a:cs typeface="Times New Roman" panose="02020603050405020304" pitchFamily="18" charset="0"/>
+            </a:endParaRPr>
+          </a:p>
+          <a:p>
+            <a:pPr marL="742950" lvl="1" indent="-285750" algn="just">
+              <a:lnSpc>
+                <a:spcPct val="107000"/>
+              </a:lnSpc>
+              <a:spcAft>
+                <a:spcPts val="0"/>
+              </a:spcAft>
+              <a:buFont typeface="Courier New" panose="02070309020205020404" pitchFamily="49" charset="0"/>
+              <a:buChar char="o"/>
+            </a:pPr>
+            <a:r>
+              <a:rPr lang="pt-BR" sz="1400" dirty="0" smtClean="0">
+                <a:latin typeface="BerkeleyStd-Medium"/>
+                <a:ea typeface="Calibri" panose="020F0502020204030204" pitchFamily="34" charset="0"/>
+                <a:cs typeface="BerkeleyStd-Medium"/>
+              </a:rPr>
+              <a:t>Atraia anunciantes e gerencie a revista de maneira lucrativa.</a:t>
+            </a:r>
+            <a:endParaRPr lang="pt-BR" sz="1200" dirty="0" smtClean="0">
+              <a:latin typeface="Calibri" panose="020F0502020204030204" pitchFamily="34" charset="0"/>
+              <a:ea typeface="Calibri" panose="020F0502020204030204" pitchFamily="34" charset="0"/>
+              <a:cs typeface="Times New Roman" panose="02020603050405020304" pitchFamily="18" charset="0"/>
+            </a:endParaRPr>
+          </a:p>
+          <a:p>
+            <a:pPr marL="742950" lvl="1" indent="-285750" algn="just">
+              <a:lnSpc>
+                <a:spcPct val="107000"/>
+              </a:lnSpc>
+              <a:spcAft>
+                <a:spcPts val="0"/>
+              </a:spcAft>
+              <a:buFont typeface="Courier New" panose="02070309020205020404" pitchFamily="49" charset="0"/>
+              <a:buChar char="o"/>
+            </a:pPr>
+            <a:r>
+              <a:rPr lang="pt-BR" sz="1400" dirty="0" smtClean="0">
+                <a:latin typeface="BerkeleyStd-Medium"/>
+                <a:ea typeface="Calibri" panose="020F0502020204030204" pitchFamily="34" charset="0"/>
+                <a:cs typeface="BerkeleyStd-Medium"/>
+              </a:rPr>
+              <a:t>Publique a revista regularmente.</a:t>
+            </a:r>
+            <a:endParaRPr lang="pt-BR" sz="1200" dirty="0" smtClean="0">
+              <a:latin typeface="Calibri" panose="020F0502020204030204" pitchFamily="34" charset="0"/>
+              <a:ea typeface="Calibri" panose="020F0502020204030204" pitchFamily="34" charset="0"/>
+              <a:cs typeface="Times New Roman" panose="02020603050405020304" pitchFamily="18" charset="0"/>
+            </a:endParaRPr>
+          </a:p>
+          <a:p>
+            <a:pPr marL="742950" lvl="1" indent="-285750" algn="just">
+              <a:lnSpc>
+                <a:spcPct val="107000"/>
+              </a:lnSpc>
+              <a:spcAft>
+                <a:spcPts val="0"/>
+              </a:spcAft>
+              <a:buFont typeface="Courier New" panose="02070309020205020404" pitchFamily="49" charset="0"/>
+              <a:buChar char="o"/>
+            </a:pPr>
+            <a:r>
+              <a:rPr lang="pt-BR" sz="1400" dirty="0" smtClean="0">
+                <a:latin typeface="BerkeleyStd-Medium"/>
+                <a:ea typeface="Calibri" panose="020F0502020204030204" pitchFamily="34" charset="0"/>
+                <a:cs typeface="BerkeleyStd-Medium"/>
+              </a:rPr>
+              <a:t>Mantenha a confiança dos leitores.</a:t>
+            </a:r>
+            <a:endParaRPr lang="pt-BR" sz="1200" dirty="0" smtClean="0">
+              <a:latin typeface="Calibri" panose="020F0502020204030204" pitchFamily="34" charset="0"/>
+              <a:ea typeface="Calibri" panose="020F0502020204030204" pitchFamily="34" charset="0"/>
+              <a:cs typeface="Times New Roman" panose="02020603050405020304" pitchFamily="18" charset="0"/>
+            </a:endParaRPr>
+          </a:p>
+          <a:p>
+            <a:pPr marL="742950" lvl="1" indent="-285750" algn="just">
+              <a:lnSpc>
+                <a:spcPct val="107000"/>
+              </a:lnSpc>
+              <a:spcAft>
+                <a:spcPts val="800"/>
+              </a:spcAft>
+              <a:buFont typeface="Courier New" panose="02070309020205020404" pitchFamily="49" charset="0"/>
+              <a:buChar char="o"/>
+            </a:pPr>
+            <a:r>
+              <a:rPr lang="pt-BR" sz="1400" dirty="0" smtClean="0">
+                <a:latin typeface="BerkeleyStd-Medium"/>
+                <a:ea typeface="Calibri" panose="020F0502020204030204" pitchFamily="34" charset="0"/>
+                <a:cs typeface="BerkeleyStd-Medium"/>
+              </a:rPr>
+              <a:t>Mantenha os donos de empresas felizes.</a:t>
+            </a:r>
+            <a:endParaRPr lang="pt-BR" sz="1200" dirty="0">
+              <a:effectLst/>
+              <a:latin typeface="Calibri" panose="020F0502020204030204" pitchFamily="34" charset="0"/>
+              <a:ea typeface="Calibri" panose="020F0502020204030204" pitchFamily="34" charset="0"/>
+              <a:cs typeface="Times New Roman" panose="02020603050405020304" pitchFamily="18" charset="0"/>
+            </a:endParaRPr>
           </a:p>
         </p:txBody>
       </p:sp>
     </p:spTree>
     <p:extLst>
       <p:ext uri="{BB962C8B-B14F-4D97-AF65-F5344CB8AC3E}">
-        <p14:creationId xmlns:p14="http://schemas.microsoft.com/office/powerpoint/2010/main" val="1405799173"/>
+        <p14:creationId xmlns:p14="http://schemas.microsoft.com/office/powerpoint/2010/main" val="138204518"/>
       </p:ext>
     </p:extLst>
   </p:cSld>
   <p:clrMapOvr>
     <a:masterClrMapping/>
   </p:clrMapOvr>
+  <p:timing>
+    <p:tnLst>
+      <p:par>
+        <p:cTn id="1" dur="indefinite" restart="never" nodeType="tmRoot"/>
+      </p:par>
+    </p:tnLst>
+  </p:timing>
 </p:sld>
 </file>
 
@@ -6827,51 +8114,580 @@
             <p:ph type="title"/>
           </p:nvPr>
         </p:nvSpPr>
-        <p:spPr/>
-        <p:txBody>
-          <a:bodyPr/>
-          <a:lstStyle/>
-          <a:p>
-            <a:r>
-              <a:rPr lang="pt-BR" b="1" dirty="0"/>
-              <a:t>Mitos de Modelagem Dimensional</a:t>
+        <p:spPr>
+          <a:xfrm>
+            <a:off x="677333" y="609600"/>
+            <a:ext cx="9694966" cy="1320800"/>
+          </a:xfrm>
+        </p:spPr>
+        <p:txBody>
+          <a:bodyPr>
+            <a:noAutofit/>
+          </a:bodyPr>
+          <a:lstStyle/>
+          <a:p>
+            <a:r>
+              <a:rPr lang="pt-BR" sz="2400" b="1" dirty="0"/>
+              <a:t>Objetivos do Data </a:t>
+            </a:r>
+            <a:r>
+              <a:rPr lang="pt-BR" sz="2400" b="1" dirty="0" err="1"/>
+              <a:t>Warehousing</a:t>
+            </a:r>
+            <a:r>
+              <a:rPr lang="pt-BR" sz="2400" b="1" dirty="0"/>
+              <a:t> e </a:t>
+            </a:r>
+            <a:r>
+              <a:rPr lang="pt-BR" sz="2400" b="1" dirty="0" smtClean="0"/>
+              <a:t>Business </a:t>
+            </a:r>
+            <a:r>
+              <a:rPr lang="pt-BR" sz="2400" b="1" dirty="0" err="1" smtClean="0"/>
+              <a:t>Intelligence</a:t>
+            </a:r>
+            <a:r>
+              <a:rPr lang="pt-BR" sz="2400" b="1" dirty="0" smtClean="0"/>
+              <a:t> –</a:t>
             </a:r>
             <a:br>
-              <a:rPr lang="pt-BR" b="1" dirty="0"/>
+              <a:rPr lang="pt-BR" sz="2400" b="1" dirty="0" smtClean="0"/>
             </a:br>
-            <a:endParaRPr lang="pt-BR" dirty="0"/>
-          </a:p>
-        </p:txBody>
-      </p:sp>
-      <p:sp>
-        <p:nvSpPr>
-          <p:cNvPr id="3" name="Espaço Reservado para Conteúdo 2"/>
-          <p:cNvSpPr>
-            <a:spLocks noGrp="1"/>
-          </p:cNvSpPr>
-          <p:nvPr>
-            <p:ph idx="1"/>
-          </p:nvPr>
-        </p:nvSpPr>
-        <p:spPr/>
-        <p:txBody>
-          <a:bodyPr/>
-          <a:lstStyle/>
-          <a:p>
-            <a:endParaRPr lang="pt-BR"/>
+            <a:r>
+              <a:rPr lang="pt-BR" sz="2400" b="1" dirty="0" smtClean="0"/>
+              <a:t>Publicação </a:t>
+            </a:r>
+            <a:r>
+              <a:rPr lang="pt-BR" sz="2400" b="1" dirty="0"/>
+              <a:t>de Metáfora para Gerentes de DW / BI</a:t>
+            </a:r>
+            <a:br>
+              <a:rPr lang="pt-BR" sz="2400" b="1" dirty="0"/>
+            </a:br>
+            <a:r>
+              <a:rPr lang="pt-BR" sz="2400" b="1" dirty="0"/>
+              <a:t/>
+            </a:r>
+            <a:br>
+              <a:rPr lang="pt-BR" sz="2400" b="1" dirty="0"/>
+            </a:br>
+            <a:endParaRPr lang="pt-BR" sz="2400" dirty="0"/>
+          </a:p>
+        </p:txBody>
+      </p:sp>
+      <p:pic>
+        <p:nvPicPr>
+          <p:cNvPr id="6" name="Imagem 5"/>
+          <p:cNvPicPr>
+            <a:picLocks noChangeAspect="1"/>
+          </p:cNvPicPr>
+          <p:nvPr/>
+        </p:nvPicPr>
+        <p:blipFill rotWithShape="1">
+          <a:blip r:embed="rId2" cstate="print">
+            <a:extLst>
+              <a:ext uri="{28A0092B-C50C-407E-A947-70E740481C1C}">
+                <a14:useLocalDpi xmlns:a14="http://schemas.microsoft.com/office/drawing/2010/main" val="0"/>
+              </a:ext>
+            </a:extLst>
+          </a:blip>
+          <a:srcRect b="9928"/>
+          <a:stretch/>
+        </p:blipFill>
+        <p:spPr>
+          <a:xfrm>
+            <a:off x="7760775" y="1361570"/>
+            <a:ext cx="2006221" cy="1209329"/>
+          </a:xfrm>
+          <a:prstGeom prst="rect">
+            <a:avLst/>
+          </a:prstGeom>
+        </p:spPr>
+      </p:pic>
+      <p:sp>
+        <p:nvSpPr>
+          <p:cNvPr id="8" name="Retângulo 7"/>
+          <p:cNvSpPr/>
+          <p:nvPr/>
+        </p:nvSpPr>
+        <p:spPr>
+          <a:xfrm>
+            <a:off x="677333" y="1511698"/>
+            <a:ext cx="6096000" cy="646331"/>
+          </a:xfrm>
+          <a:prstGeom prst="rect">
+            <a:avLst/>
+          </a:prstGeom>
+        </p:spPr>
+        <p:txBody>
+          <a:bodyPr>
+            <a:spAutoFit/>
+          </a:bodyPr>
+          <a:lstStyle/>
+          <a:p>
+            <a:r>
+              <a:rPr lang="pt-BR" dirty="0"/>
+              <a:t>Agora reformule as responsabilidades do editor de revista com o de gerente de DW / BI:</a:t>
+            </a:r>
+          </a:p>
+        </p:txBody>
+      </p:sp>
+      <p:sp>
+        <p:nvSpPr>
+          <p:cNvPr id="3" name="Retângulo 2"/>
+          <p:cNvSpPr/>
+          <p:nvPr/>
+        </p:nvSpPr>
+        <p:spPr>
+          <a:xfrm>
+            <a:off x="677333" y="2188324"/>
+            <a:ext cx="10940955" cy="4669676"/>
+          </a:xfrm>
+          <a:prstGeom prst="rect">
+            <a:avLst/>
+          </a:prstGeom>
+        </p:spPr>
+        <p:txBody>
+          <a:bodyPr wrap="square">
+            <a:spAutoFit/>
+          </a:bodyPr>
+          <a:lstStyle/>
+          <a:p>
+            <a:pPr marL="342900" lvl="0" indent="-342900" algn="just">
+              <a:lnSpc>
+                <a:spcPct val="107000"/>
+              </a:lnSpc>
+              <a:spcAft>
+                <a:spcPts val="0"/>
+              </a:spcAft>
+              <a:buFont typeface="Symbol" panose="05050102010706020507" pitchFamily="18" charset="2"/>
+              <a:buChar char=""/>
+            </a:pPr>
+            <a:r>
+              <a:rPr lang="pt-BR" sz="1400" dirty="0">
+                <a:latin typeface="BerkeleyStd-Medium"/>
+                <a:ea typeface="Calibri" panose="020F0502020204030204" pitchFamily="34" charset="0"/>
+                <a:cs typeface="BerkeleyStd-Medium"/>
+              </a:rPr>
+              <a:t>Entenda os usuários de negócios:</a:t>
+            </a:r>
+            <a:endParaRPr lang="pt-BR" sz="1200" dirty="0">
+              <a:latin typeface="BerkeleyStd-Medium"/>
+              <a:ea typeface="Calibri" panose="020F0502020204030204" pitchFamily="34" charset="0"/>
+              <a:cs typeface="Times New Roman" panose="02020603050405020304" pitchFamily="18" charset="0"/>
+            </a:endParaRPr>
+          </a:p>
+          <a:p>
+            <a:pPr marL="742950" lvl="1" indent="-285750" algn="just">
+              <a:lnSpc>
+                <a:spcPct val="107000"/>
+              </a:lnSpc>
+              <a:spcAft>
+                <a:spcPts val="0"/>
+              </a:spcAft>
+              <a:buFont typeface="Courier New" panose="02070309020205020404" pitchFamily="49" charset="0"/>
+              <a:buChar char="o"/>
+            </a:pPr>
+            <a:r>
+              <a:rPr lang="pt-BR" sz="1400" dirty="0">
+                <a:latin typeface="BerkeleyStd-Medium"/>
+                <a:ea typeface="Calibri" panose="020F0502020204030204" pitchFamily="34" charset="0"/>
+                <a:cs typeface="BerkeleyStd-Medium"/>
+              </a:rPr>
+              <a:t>Entenda suas responsabilidades de trabalho, metas e objetivos.</a:t>
+            </a:r>
+            <a:endParaRPr lang="pt-BR" sz="1200" dirty="0">
+              <a:latin typeface="BerkeleyStd-Medium"/>
+              <a:ea typeface="Calibri" panose="020F0502020204030204" pitchFamily="34" charset="0"/>
+              <a:cs typeface="Times New Roman" panose="02020603050405020304" pitchFamily="18" charset="0"/>
+            </a:endParaRPr>
+          </a:p>
+          <a:p>
+            <a:pPr marL="742950" lvl="1" indent="-285750" algn="just">
+              <a:lnSpc>
+                <a:spcPct val="107000"/>
+              </a:lnSpc>
+              <a:spcAft>
+                <a:spcPts val="0"/>
+              </a:spcAft>
+              <a:buFont typeface="Courier New" panose="02070309020205020404" pitchFamily="49" charset="0"/>
+              <a:buChar char="o"/>
+            </a:pPr>
+            <a:r>
+              <a:rPr lang="pt-BR" sz="1400" dirty="0">
+                <a:latin typeface="BerkeleyStd-Medium"/>
+                <a:ea typeface="Calibri" panose="020F0502020204030204" pitchFamily="34" charset="0"/>
+                <a:cs typeface="BerkeleyStd-Medium"/>
+              </a:rPr>
+              <a:t>Determine as decisões que os usuários corporativos desejam tomar com a ajuda do sistema DW / BI.</a:t>
+            </a:r>
+            <a:endParaRPr lang="pt-BR" sz="1200" dirty="0">
+              <a:latin typeface="BerkeleyStd-Medium"/>
+              <a:ea typeface="Calibri" panose="020F0502020204030204" pitchFamily="34" charset="0"/>
+              <a:cs typeface="Times New Roman" panose="02020603050405020304" pitchFamily="18" charset="0"/>
+            </a:endParaRPr>
+          </a:p>
+          <a:p>
+            <a:pPr marL="742950" lvl="1" indent="-285750" algn="just">
+              <a:lnSpc>
+                <a:spcPct val="107000"/>
+              </a:lnSpc>
+              <a:spcAft>
+                <a:spcPts val="0"/>
+              </a:spcAft>
+              <a:buFont typeface="Courier New" panose="02070309020205020404" pitchFamily="49" charset="0"/>
+              <a:buChar char="o"/>
+            </a:pPr>
+            <a:r>
+              <a:rPr lang="pt-BR" sz="1400" dirty="0">
+                <a:latin typeface="BerkeleyStd-Medium"/>
+                <a:ea typeface="Calibri" panose="020F0502020204030204" pitchFamily="34" charset="0"/>
+                <a:cs typeface="BerkeleyStd-Medium"/>
+              </a:rPr>
+              <a:t>Identifique os "melhores" usuários que tomam decisões eficazes e de alto impacto.</a:t>
+            </a:r>
+            <a:endParaRPr lang="pt-BR" sz="1200" dirty="0">
+              <a:latin typeface="BerkeleyStd-Medium"/>
+              <a:ea typeface="Calibri" panose="020F0502020204030204" pitchFamily="34" charset="0"/>
+              <a:cs typeface="Times New Roman" panose="02020603050405020304" pitchFamily="18" charset="0"/>
+            </a:endParaRPr>
+          </a:p>
+          <a:p>
+            <a:pPr marL="742950" lvl="1" indent="-285750" algn="just">
+              <a:lnSpc>
+                <a:spcPct val="107000"/>
+              </a:lnSpc>
+              <a:spcAft>
+                <a:spcPts val="0"/>
+              </a:spcAft>
+              <a:buFont typeface="Courier New" panose="02070309020205020404" pitchFamily="49" charset="0"/>
+              <a:buChar char="o"/>
+            </a:pPr>
+            <a:r>
+              <a:rPr lang="pt-BR" sz="1400" dirty="0">
+                <a:latin typeface="BerkeleyStd-Medium"/>
+                <a:ea typeface="Calibri" panose="020F0502020204030204" pitchFamily="34" charset="0"/>
+                <a:cs typeface="BerkeleyStd-Medium"/>
+              </a:rPr>
+              <a:t>Encontre novos usuários em potencial e conscientize-os sobre os recursos do sistema DW / BI.</a:t>
+            </a:r>
+            <a:endParaRPr lang="pt-BR" sz="1200" dirty="0">
+              <a:latin typeface="BerkeleyStd-Medium"/>
+              <a:ea typeface="Calibri" panose="020F0502020204030204" pitchFamily="34" charset="0"/>
+              <a:cs typeface="Times New Roman" panose="02020603050405020304" pitchFamily="18" charset="0"/>
+            </a:endParaRPr>
+          </a:p>
+          <a:p>
+            <a:pPr marL="342900" lvl="0" indent="-342900" algn="just">
+              <a:lnSpc>
+                <a:spcPct val="107000"/>
+              </a:lnSpc>
+              <a:spcAft>
+                <a:spcPts val="0"/>
+              </a:spcAft>
+              <a:buFont typeface="Symbol" panose="05050102010706020507" pitchFamily="18" charset="2"/>
+              <a:buChar char=""/>
+            </a:pPr>
+            <a:r>
+              <a:rPr lang="pt-BR" sz="1400" dirty="0">
+                <a:latin typeface="BerkeleyStd-Medium"/>
+                <a:ea typeface="Calibri" panose="020F0502020204030204" pitchFamily="34" charset="0"/>
+                <a:cs typeface="BerkeleyStd-Medium"/>
+              </a:rPr>
+              <a:t>Forneça informações e análises de alta qualidade, relevantes e acessíveis para os usuários de negócios:</a:t>
+            </a:r>
+            <a:endParaRPr lang="pt-BR" sz="1200" dirty="0">
+              <a:latin typeface="BerkeleyStd-Medium"/>
+              <a:ea typeface="Calibri" panose="020F0502020204030204" pitchFamily="34" charset="0"/>
+              <a:cs typeface="Times New Roman" panose="02020603050405020304" pitchFamily="18" charset="0"/>
+            </a:endParaRPr>
+          </a:p>
+          <a:p>
+            <a:pPr marL="742950" lvl="1" indent="-285750" algn="just">
+              <a:lnSpc>
+                <a:spcPct val="107000"/>
+              </a:lnSpc>
+              <a:spcAft>
+                <a:spcPts val="0"/>
+              </a:spcAft>
+              <a:buFont typeface="Courier New" panose="02070309020205020404" pitchFamily="49" charset="0"/>
+              <a:buChar char="o"/>
+            </a:pPr>
+            <a:r>
+              <a:rPr lang="pt-BR" sz="1400" dirty="0">
+                <a:latin typeface="BerkeleyStd-Medium"/>
+                <a:ea typeface="Calibri" panose="020F0502020204030204" pitchFamily="34" charset="0"/>
+                <a:cs typeface="BerkeleyStd-Medium"/>
+              </a:rPr>
+              <a:t>Escolha os dados mais robustos e acionáveis para apresentar no sistema DW / BI, </a:t>
+            </a:r>
+            <a:r>
+              <a:rPr lang="pt-BR" sz="1400" dirty="0" smtClean="0">
+                <a:latin typeface="BerkeleyStd-Medium"/>
+                <a:ea typeface="Calibri" panose="020F0502020204030204" pitchFamily="34" charset="0"/>
+                <a:cs typeface="BerkeleyStd-Medium"/>
+              </a:rPr>
+              <a:t>cuidadosamente </a:t>
+            </a:r>
+            <a:r>
+              <a:rPr lang="pt-BR" sz="1400" dirty="0">
+                <a:latin typeface="BerkeleyStd-Medium"/>
+                <a:ea typeface="Calibri" panose="020F0502020204030204" pitchFamily="34" charset="0"/>
+                <a:cs typeface="BerkeleyStd-Medium"/>
+              </a:rPr>
+              <a:t>selecionados do vasto universo de possíveis fontes de dados em sua organização.</a:t>
+            </a:r>
+            <a:endParaRPr lang="pt-BR" sz="1200" dirty="0">
+              <a:latin typeface="BerkeleyStd-Medium"/>
+              <a:ea typeface="Calibri" panose="020F0502020204030204" pitchFamily="34" charset="0"/>
+              <a:cs typeface="Times New Roman" panose="02020603050405020304" pitchFamily="18" charset="0"/>
+            </a:endParaRPr>
+          </a:p>
+          <a:p>
+            <a:pPr marL="742950" lvl="1" indent="-285750" algn="just">
+              <a:lnSpc>
+                <a:spcPct val="107000"/>
+              </a:lnSpc>
+              <a:spcAft>
+                <a:spcPts val="0"/>
+              </a:spcAft>
+              <a:buFont typeface="Courier New" panose="02070309020205020404" pitchFamily="49" charset="0"/>
+              <a:buChar char="o"/>
+            </a:pPr>
+            <a:r>
+              <a:rPr lang="pt-BR" sz="1400" dirty="0">
+                <a:latin typeface="BerkeleyStd-Medium"/>
+                <a:ea typeface="Calibri" panose="020F0502020204030204" pitchFamily="34" charset="0"/>
+                <a:cs typeface="BerkeleyStd-Medium"/>
+              </a:rPr>
+              <a:t>Torne as interfaces e os aplicativos do usuário simples e orientados a modelos, correspondendo explicitamente aos perfis de processamento cognitivo dos usuários.</a:t>
+            </a:r>
+            <a:endParaRPr lang="pt-BR" sz="1200" dirty="0">
+              <a:latin typeface="BerkeleyStd-Medium"/>
+              <a:ea typeface="Calibri" panose="020F0502020204030204" pitchFamily="34" charset="0"/>
+              <a:cs typeface="Times New Roman" panose="02020603050405020304" pitchFamily="18" charset="0"/>
+            </a:endParaRPr>
+          </a:p>
+          <a:p>
+            <a:pPr marL="742950" lvl="1" indent="-285750" algn="just">
+              <a:lnSpc>
+                <a:spcPct val="107000"/>
+              </a:lnSpc>
+              <a:spcAft>
+                <a:spcPts val="0"/>
+              </a:spcAft>
+              <a:buFont typeface="Courier New" panose="02070309020205020404" pitchFamily="49" charset="0"/>
+              <a:buChar char="o"/>
+            </a:pPr>
+            <a:r>
+              <a:rPr lang="pt-BR" sz="1400" dirty="0">
+                <a:latin typeface="BerkeleyStd-Medium"/>
+                <a:ea typeface="Calibri" panose="020F0502020204030204" pitchFamily="34" charset="0"/>
+                <a:cs typeface="BerkeleyStd-Medium"/>
+              </a:rPr>
+              <a:t>Verifique se os dados são precisos e confiáveis, rotulando-os de maneira consistente em toda a empresa.</a:t>
+            </a:r>
+            <a:endParaRPr lang="pt-BR" sz="1200" dirty="0">
+              <a:latin typeface="BerkeleyStd-Medium"/>
+              <a:ea typeface="Calibri" panose="020F0502020204030204" pitchFamily="34" charset="0"/>
+              <a:cs typeface="Times New Roman" panose="02020603050405020304" pitchFamily="18" charset="0"/>
+            </a:endParaRPr>
+          </a:p>
+          <a:p>
+            <a:pPr marL="742950" lvl="1" indent="-285750" algn="just">
+              <a:lnSpc>
+                <a:spcPct val="107000"/>
+              </a:lnSpc>
+              <a:spcAft>
+                <a:spcPts val="0"/>
+              </a:spcAft>
+              <a:buFont typeface="Courier New" panose="02070309020205020404" pitchFamily="49" charset="0"/>
+              <a:buChar char="o"/>
+            </a:pPr>
+            <a:r>
+              <a:rPr lang="pt-BR" sz="1400" dirty="0">
+                <a:latin typeface="BerkeleyStd-Medium"/>
+                <a:ea typeface="Calibri" panose="020F0502020204030204" pitchFamily="34" charset="0"/>
+                <a:cs typeface="BerkeleyStd-Medium"/>
+              </a:rPr>
+              <a:t>Monitore continuamente a precisão dos dados e análises.</a:t>
+            </a:r>
+            <a:endParaRPr lang="pt-BR" sz="1200" dirty="0">
+              <a:latin typeface="BerkeleyStd-Medium"/>
+              <a:ea typeface="Calibri" panose="020F0502020204030204" pitchFamily="34" charset="0"/>
+              <a:cs typeface="Times New Roman" panose="02020603050405020304" pitchFamily="18" charset="0"/>
+            </a:endParaRPr>
+          </a:p>
+          <a:p>
+            <a:pPr marL="742950" lvl="1" indent="-285750" algn="just">
+              <a:lnSpc>
+                <a:spcPct val="107000"/>
+              </a:lnSpc>
+              <a:spcAft>
+                <a:spcPts val="0"/>
+              </a:spcAft>
+              <a:buFont typeface="Courier New" panose="02070309020205020404" pitchFamily="49" charset="0"/>
+              <a:buChar char="o"/>
+            </a:pPr>
+            <a:r>
+              <a:rPr lang="pt-BR" sz="1400" dirty="0">
+                <a:latin typeface="BerkeleyStd-Medium"/>
+                <a:ea typeface="Calibri" panose="020F0502020204030204" pitchFamily="34" charset="0"/>
+                <a:cs typeface="BerkeleyStd-Medium"/>
+              </a:rPr>
+              <a:t>Adapte-se à mudança de perfis de usuários, requisitos e prioridades de negócios, juntamente com a disponibilidade de novas fontes de dados.</a:t>
+            </a:r>
+            <a:endParaRPr lang="pt-BR" sz="1200" dirty="0">
+              <a:latin typeface="BerkeleyStd-Medium"/>
+              <a:ea typeface="Calibri" panose="020F0502020204030204" pitchFamily="34" charset="0"/>
+              <a:cs typeface="Times New Roman" panose="02020603050405020304" pitchFamily="18" charset="0"/>
+            </a:endParaRPr>
+          </a:p>
+          <a:p>
+            <a:pPr marL="342900" lvl="0" indent="-342900" algn="just">
+              <a:lnSpc>
+                <a:spcPct val="107000"/>
+              </a:lnSpc>
+              <a:spcAft>
+                <a:spcPts val="0"/>
+              </a:spcAft>
+              <a:buFont typeface="Symbol" panose="05050102010706020507" pitchFamily="18" charset="2"/>
+              <a:buChar char=""/>
+            </a:pPr>
+            <a:r>
+              <a:rPr lang="pt-BR" sz="1400" dirty="0">
+                <a:latin typeface="BerkeleyStd-Medium"/>
+                <a:ea typeface="Calibri" panose="020F0502020204030204" pitchFamily="34" charset="0"/>
+                <a:cs typeface="BerkeleyStd-Medium"/>
+              </a:rPr>
+              <a:t>Sustente o ambiente DW / BI:</a:t>
+            </a:r>
+            <a:endParaRPr lang="pt-BR" sz="1200" dirty="0">
+              <a:latin typeface="BerkeleyStd-Medium"/>
+              <a:ea typeface="Calibri" panose="020F0502020204030204" pitchFamily="34" charset="0"/>
+              <a:cs typeface="Times New Roman" panose="02020603050405020304" pitchFamily="18" charset="0"/>
+            </a:endParaRPr>
+          </a:p>
+          <a:p>
+            <a:pPr marL="742950" lvl="1" indent="-285750" algn="just">
+              <a:lnSpc>
+                <a:spcPct val="107000"/>
+              </a:lnSpc>
+              <a:spcAft>
+                <a:spcPts val="0"/>
+              </a:spcAft>
+              <a:buFont typeface="Courier New" panose="02070309020205020404" pitchFamily="49" charset="0"/>
+              <a:buChar char="o"/>
+            </a:pPr>
+            <a:r>
+              <a:rPr lang="pt-BR" sz="1400" dirty="0">
+                <a:latin typeface="BerkeleyStd-Medium"/>
+                <a:ea typeface="Calibri" panose="020F0502020204030204" pitchFamily="34" charset="0"/>
+                <a:cs typeface="BerkeleyStd-Medium"/>
+              </a:rPr>
+              <a:t>Pegue uma parte do crédito para as decisões de negócios feitas usando o sistema DW / BI, e use esses sucessos para justificar as despesas com pessoal e em curso.</a:t>
+            </a:r>
+            <a:endParaRPr lang="pt-BR" sz="1200" dirty="0">
+              <a:latin typeface="BerkeleyStd-Medium"/>
+              <a:ea typeface="Calibri" panose="020F0502020204030204" pitchFamily="34" charset="0"/>
+              <a:cs typeface="Times New Roman" panose="02020603050405020304" pitchFamily="18" charset="0"/>
+            </a:endParaRPr>
+          </a:p>
+          <a:p>
+            <a:pPr marL="742950" lvl="1" indent="-285750" algn="just">
+              <a:lnSpc>
+                <a:spcPct val="107000"/>
+              </a:lnSpc>
+              <a:spcAft>
+                <a:spcPts val="0"/>
+              </a:spcAft>
+              <a:buFont typeface="Courier New" panose="02070309020205020404" pitchFamily="49" charset="0"/>
+              <a:buChar char="o"/>
+            </a:pPr>
+            <a:r>
+              <a:rPr lang="pt-BR" sz="1400" dirty="0">
+                <a:latin typeface="BerkeleyStd-Medium"/>
+                <a:ea typeface="Calibri" panose="020F0502020204030204" pitchFamily="34" charset="0"/>
+                <a:cs typeface="BerkeleyStd-Medium"/>
+              </a:rPr>
+              <a:t>Atualize o sistema DW / BI regularmente.</a:t>
+            </a:r>
+            <a:endParaRPr lang="pt-BR" sz="1200" dirty="0">
+              <a:latin typeface="BerkeleyStd-Medium"/>
+              <a:ea typeface="Calibri" panose="020F0502020204030204" pitchFamily="34" charset="0"/>
+              <a:cs typeface="Times New Roman" panose="02020603050405020304" pitchFamily="18" charset="0"/>
+            </a:endParaRPr>
+          </a:p>
+          <a:p>
+            <a:pPr marL="742950" lvl="1" indent="-285750" algn="just">
+              <a:lnSpc>
+                <a:spcPct val="107000"/>
+              </a:lnSpc>
+              <a:spcAft>
+                <a:spcPts val="0"/>
+              </a:spcAft>
+              <a:buFont typeface="Courier New" panose="02070309020205020404" pitchFamily="49" charset="0"/>
+              <a:buChar char="o"/>
+            </a:pPr>
+            <a:r>
+              <a:rPr lang="pt-BR" sz="1400" dirty="0">
+                <a:latin typeface="BerkeleyStd-Medium"/>
+                <a:ea typeface="Calibri" panose="020F0502020204030204" pitchFamily="34" charset="0"/>
+                <a:cs typeface="BerkeleyStd-Medium"/>
+              </a:rPr>
+              <a:t>Mantenha a confiança dos usuários corporativos.</a:t>
+            </a:r>
+            <a:endParaRPr lang="pt-BR" sz="1200" dirty="0">
+              <a:latin typeface="BerkeleyStd-Medium"/>
+              <a:ea typeface="Calibri" panose="020F0502020204030204" pitchFamily="34" charset="0"/>
+              <a:cs typeface="Times New Roman" panose="02020603050405020304" pitchFamily="18" charset="0"/>
+            </a:endParaRPr>
+          </a:p>
+          <a:p>
+            <a:pPr marL="742950" lvl="1" indent="-285750" algn="just">
+              <a:lnSpc>
+                <a:spcPct val="107000"/>
+              </a:lnSpc>
+              <a:spcAft>
+                <a:spcPts val="800"/>
+              </a:spcAft>
+              <a:buFont typeface="Courier New" panose="02070309020205020404" pitchFamily="49" charset="0"/>
+              <a:buChar char="o"/>
+            </a:pPr>
+            <a:r>
+              <a:rPr lang="pt-BR" sz="1400" dirty="0">
+                <a:latin typeface="BerkeleyStd-Medium"/>
+                <a:ea typeface="Calibri" panose="020F0502020204030204" pitchFamily="34" charset="0"/>
+                <a:cs typeface="BerkeleyStd-Medium"/>
+              </a:rPr>
+              <a:t>Mantenha os usuários de negócios, os patrocinadores executivos e o gerenciamento de TI satisfeitos.</a:t>
+            </a:r>
+            <a:endParaRPr lang="pt-BR" sz="1200" dirty="0">
+              <a:effectLst/>
+              <a:latin typeface="BerkeleyStd-Medium"/>
+              <a:ea typeface="Calibri" panose="020F0502020204030204" pitchFamily="34" charset="0"/>
+              <a:cs typeface="Times New Roman" panose="02020603050405020304" pitchFamily="18" charset="0"/>
+            </a:endParaRPr>
           </a:p>
         </p:txBody>
       </p:sp>
     </p:spTree>
     <p:extLst>
       <p:ext uri="{BB962C8B-B14F-4D97-AF65-F5344CB8AC3E}">
-        <p14:creationId xmlns:p14="http://schemas.microsoft.com/office/powerpoint/2010/main" val="367052800"/>
+        <p14:creationId xmlns:p14="http://schemas.microsoft.com/office/powerpoint/2010/main" val="2951215911"/>
       </p:ext>
     </p:extLst>
   </p:cSld>
   <p:clrMapOvr>
     <a:masterClrMapping/>
   </p:clrMapOvr>
+  <p:timing>
+    <p:tnLst>
+      <p:par>
+        <p:cTn id="1" dur="indefinite" restart="never" nodeType="tmRoot"/>
+      </p:par>
+    </p:tnLst>
+  </p:timing>
 </p:sld>
 </file>
 

</xml_diff>